<commit_message>
Add figures chapter 13
</commit_message>
<xml_diff>
--- a/Figures/Chapter_01/drawings/Fig_PV_history.pptx
+++ b/Figures/Chapter_01/drawings/Fig_PV_history.pptx
@@ -244,7 +244,7 @@
           <a:p>
             <a:fld id="{E53556A6-779D-436A-9960-E76995E88BDD}" type="datetimeFigureOut">
               <a:rPr lang="en-GB" smtClean="0"/>
-              <a:t>17/02/2022</a:t>
+              <a:t>21/02/2022</a:t>
             </a:fld>
             <a:endParaRPr lang="en-GB"/>
           </a:p>
@@ -414,7 +414,7 @@
           <a:p>
             <a:fld id="{E53556A6-779D-436A-9960-E76995E88BDD}" type="datetimeFigureOut">
               <a:rPr lang="en-GB" smtClean="0"/>
-              <a:t>17/02/2022</a:t>
+              <a:t>21/02/2022</a:t>
             </a:fld>
             <a:endParaRPr lang="en-GB"/>
           </a:p>
@@ -594,7 +594,7 @@
           <a:p>
             <a:fld id="{E53556A6-779D-436A-9960-E76995E88BDD}" type="datetimeFigureOut">
               <a:rPr lang="en-GB" smtClean="0"/>
-              <a:t>17/02/2022</a:t>
+              <a:t>21/02/2022</a:t>
             </a:fld>
             <a:endParaRPr lang="en-GB"/>
           </a:p>
@@ -764,7 +764,7 @@
           <a:p>
             <a:fld id="{E53556A6-779D-436A-9960-E76995E88BDD}" type="datetimeFigureOut">
               <a:rPr lang="en-GB" smtClean="0"/>
-              <a:t>17/02/2022</a:t>
+              <a:t>21/02/2022</a:t>
             </a:fld>
             <a:endParaRPr lang="en-GB"/>
           </a:p>
@@ -1008,7 +1008,7 @@
           <a:p>
             <a:fld id="{E53556A6-779D-436A-9960-E76995E88BDD}" type="datetimeFigureOut">
               <a:rPr lang="en-GB" smtClean="0"/>
-              <a:t>17/02/2022</a:t>
+              <a:t>21/02/2022</a:t>
             </a:fld>
             <a:endParaRPr lang="en-GB"/>
           </a:p>
@@ -1240,7 +1240,7 @@
           <a:p>
             <a:fld id="{E53556A6-779D-436A-9960-E76995E88BDD}" type="datetimeFigureOut">
               <a:rPr lang="en-GB" smtClean="0"/>
-              <a:t>17/02/2022</a:t>
+              <a:t>21/02/2022</a:t>
             </a:fld>
             <a:endParaRPr lang="en-GB"/>
           </a:p>
@@ -1607,7 +1607,7 @@
           <a:p>
             <a:fld id="{E53556A6-779D-436A-9960-E76995E88BDD}" type="datetimeFigureOut">
               <a:rPr lang="en-GB" smtClean="0"/>
-              <a:t>17/02/2022</a:t>
+              <a:t>21/02/2022</a:t>
             </a:fld>
             <a:endParaRPr lang="en-GB"/>
           </a:p>
@@ -1725,7 +1725,7 @@
           <a:p>
             <a:fld id="{E53556A6-779D-436A-9960-E76995E88BDD}" type="datetimeFigureOut">
               <a:rPr lang="en-GB" smtClean="0"/>
-              <a:t>17/02/2022</a:t>
+              <a:t>21/02/2022</a:t>
             </a:fld>
             <a:endParaRPr lang="en-GB"/>
           </a:p>
@@ -1820,7 +1820,7 @@
           <a:p>
             <a:fld id="{E53556A6-779D-436A-9960-E76995E88BDD}" type="datetimeFigureOut">
               <a:rPr lang="en-GB" smtClean="0"/>
-              <a:t>17/02/2022</a:t>
+              <a:t>21/02/2022</a:t>
             </a:fld>
             <a:endParaRPr lang="en-GB"/>
           </a:p>
@@ -2097,7 +2097,7 @@
           <a:p>
             <a:fld id="{E53556A6-779D-436A-9960-E76995E88BDD}" type="datetimeFigureOut">
               <a:rPr lang="en-GB" smtClean="0"/>
-              <a:t>17/02/2022</a:t>
+              <a:t>21/02/2022</a:t>
             </a:fld>
             <a:endParaRPr lang="en-GB"/>
           </a:p>
@@ -2354,7 +2354,7 @@
           <a:p>
             <a:fld id="{E53556A6-779D-436A-9960-E76995E88BDD}" type="datetimeFigureOut">
               <a:rPr lang="en-GB" smtClean="0"/>
-              <a:t>17/02/2022</a:t>
+              <a:t>21/02/2022</a:t>
             </a:fld>
             <a:endParaRPr lang="en-GB"/>
           </a:p>
@@ -2567,7 +2567,7 @@
           <a:p>
             <a:fld id="{E53556A6-779D-436A-9960-E76995E88BDD}" type="datetimeFigureOut">
               <a:rPr lang="en-GB" smtClean="0"/>
-              <a:t>17/02/2022</a:t>
+              <a:t>21/02/2022</a:t>
             </a:fld>
             <a:endParaRPr lang="en-GB"/>
           </a:p>
@@ -4334,7 +4334,7 @@
           </p:blipFill>
           <p:spPr bwMode="auto">
             <a:xfrm>
-              <a:off x="4825547" y="6163311"/>
+              <a:off x="4902728" y="5937426"/>
               <a:ext cx="2074086" cy="2145303"/>
             </a:xfrm>
             <a:prstGeom prst="rect">
@@ -4774,8 +4774,8 @@
           </p:nvSpPr>
           <p:spPr>
             <a:xfrm>
-              <a:off x="4413870" y="8346052"/>
-              <a:ext cx="3034617" cy="461665"/>
+              <a:off x="4413870" y="8109117"/>
+              <a:ext cx="3034617" cy="830997"/>
             </a:xfrm>
             <a:prstGeom prst="rect">
               <a:avLst/>
@@ -4791,7 +4791,7 @@
               <a:pPr algn="just"/>
               <a:r>
                 <a:rPr lang="en-GB" sz="1200" dirty="0"/>
-                <a:t>The first satellite with a solar PV power system (NASA Vanguard 1) is launched.</a:t>
+                <a:t>The first satellite with a solar PV power system (NASA Vanguard 1) was launched. The Russian satellite Sputnik 3 launched the same year also included solar cells. </a:t>
               </a:r>
             </a:p>
           </p:txBody>
@@ -5546,7 +5546,7 @@
           <a:graphicData uri="http://schemas.openxmlformats.org/presentationml/2006/ole">
             <mc:AlternateContent xmlns:mc="http://schemas.openxmlformats.org/markup-compatibility/2006">
               <mc:Choice xmlns:v="urn:schemas-microsoft-com:vml" Requires="v">
-                <p:oleObj spid="_x0000_s1038" name="Bitmap Image" r:id="rId7" imgW="5295960" imgH="5181480" progId="Paint.Picture">
+                <p:oleObj spid="_x0000_s1039" name="Bitmap Image" r:id="rId7" imgW="5295960" imgH="5181480" progId="Paint.Picture">
                   <p:embed/>
                 </p:oleObj>
               </mc:Choice>

</xml_diff>

<commit_message>
change units in PV landuse
</commit_message>
<xml_diff>
--- a/Figures/Chapter_01/drawings/Fig_PV_history.pptx
+++ b/Figures/Chapter_01/drawings/Fig_PV_history.pptx
@@ -244,7 +244,7 @@
           <a:p>
             <a:fld id="{E53556A6-779D-436A-9960-E76995E88BDD}" type="datetimeFigureOut">
               <a:rPr lang="en-GB" smtClean="0"/>
-              <a:t>13/07/2022</a:t>
+              <a:t>24/08/2022</a:t>
             </a:fld>
             <a:endParaRPr lang="en-GB"/>
           </a:p>
@@ -414,7 +414,7 @@
           <a:p>
             <a:fld id="{E53556A6-779D-436A-9960-E76995E88BDD}" type="datetimeFigureOut">
               <a:rPr lang="en-GB" smtClean="0"/>
-              <a:t>13/07/2022</a:t>
+              <a:t>24/08/2022</a:t>
             </a:fld>
             <a:endParaRPr lang="en-GB"/>
           </a:p>
@@ -594,7 +594,7 @@
           <a:p>
             <a:fld id="{E53556A6-779D-436A-9960-E76995E88BDD}" type="datetimeFigureOut">
               <a:rPr lang="en-GB" smtClean="0"/>
-              <a:t>13/07/2022</a:t>
+              <a:t>24/08/2022</a:t>
             </a:fld>
             <a:endParaRPr lang="en-GB"/>
           </a:p>
@@ -764,7 +764,7 @@
           <a:p>
             <a:fld id="{E53556A6-779D-436A-9960-E76995E88BDD}" type="datetimeFigureOut">
               <a:rPr lang="en-GB" smtClean="0"/>
-              <a:t>13/07/2022</a:t>
+              <a:t>24/08/2022</a:t>
             </a:fld>
             <a:endParaRPr lang="en-GB"/>
           </a:p>
@@ -1008,7 +1008,7 @@
           <a:p>
             <a:fld id="{E53556A6-779D-436A-9960-E76995E88BDD}" type="datetimeFigureOut">
               <a:rPr lang="en-GB" smtClean="0"/>
-              <a:t>13/07/2022</a:t>
+              <a:t>24/08/2022</a:t>
             </a:fld>
             <a:endParaRPr lang="en-GB"/>
           </a:p>
@@ -1240,7 +1240,7 @@
           <a:p>
             <a:fld id="{E53556A6-779D-436A-9960-E76995E88BDD}" type="datetimeFigureOut">
               <a:rPr lang="en-GB" smtClean="0"/>
-              <a:t>13/07/2022</a:t>
+              <a:t>24/08/2022</a:t>
             </a:fld>
             <a:endParaRPr lang="en-GB"/>
           </a:p>
@@ -1607,7 +1607,7 @@
           <a:p>
             <a:fld id="{E53556A6-779D-436A-9960-E76995E88BDD}" type="datetimeFigureOut">
               <a:rPr lang="en-GB" smtClean="0"/>
-              <a:t>13/07/2022</a:t>
+              <a:t>24/08/2022</a:t>
             </a:fld>
             <a:endParaRPr lang="en-GB"/>
           </a:p>
@@ -1725,7 +1725,7 @@
           <a:p>
             <a:fld id="{E53556A6-779D-436A-9960-E76995E88BDD}" type="datetimeFigureOut">
               <a:rPr lang="en-GB" smtClean="0"/>
-              <a:t>13/07/2022</a:t>
+              <a:t>24/08/2022</a:t>
             </a:fld>
             <a:endParaRPr lang="en-GB"/>
           </a:p>
@@ -1820,7 +1820,7 @@
           <a:p>
             <a:fld id="{E53556A6-779D-436A-9960-E76995E88BDD}" type="datetimeFigureOut">
               <a:rPr lang="en-GB" smtClean="0"/>
-              <a:t>13/07/2022</a:t>
+              <a:t>24/08/2022</a:t>
             </a:fld>
             <a:endParaRPr lang="en-GB"/>
           </a:p>
@@ -2097,7 +2097,7 @@
           <a:p>
             <a:fld id="{E53556A6-779D-436A-9960-E76995E88BDD}" type="datetimeFigureOut">
               <a:rPr lang="en-GB" smtClean="0"/>
-              <a:t>13/07/2022</a:t>
+              <a:t>24/08/2022</a:t>
             </a:fld>
             <a:endParaRPr lang="en-GB"/>
           </a:p>
@@ -2354,7 +2354,7 @@
           <a:p>
             <a:fld id="{E53556A6-779D-436A-9960-E76995E88BDD}" type="datetimeFigureOut">
               <a:rPr lang="en-GB" smtClean="0"/>
-              <a:t>13/07/2022</a:t>
+              <a:t>24/08/2022</a:t>
             </a:fld>
             <a:endParaRPr lang="en-GB"/>
           </a:p>
@@ -2567,7 +2567,7 @@
           <a:p>
             <a:fld id="{E53556A6-779D-436A-9960-E76995E88BDD}" type="datetimeFigureOut">
               <a:rPr lang="en-GB" smtClean="0"/>
-              <a:t>13/07/2022</a:t>
+              <a:t>24/08/2022</a:t>
             </a:fld>
             <a:endParaRPr lang="en-GB"/>
           </a:p>
@@ -5546,7 +5546,7 @@
           <a:graphicData uri="http://schemas.openxmlformats.org/presentationml/2006/ole">
             <mc:AlternateContent xmlns:mc="http://schemas.openxmlformats.org/markup-compatibility/2006">
               <mc:Choice xmlns:v="urn:schemas-microsoft-com:vml" Requires="v">
-                <p:oleObj spid="_x0000_s1043" name="Bitmap Image" r:id="rId7" imgW="5295960" imgH="5181480" progId="Paint.Picture">
+                <p:oleObj spid="_x0000_s1044" name="Bitmap Image" r:id="rId7" imgW="5295960" imgH="5181480" progId="Paint.Picture">
                   <p:embed/>
                 </p:oleObj>
               </mc:Choice>
@@ -8398,7 +8398,15 @@
               </a:r>
               <a:r>
                 <a:rPr lang="en-GB" sz="1200" dirty="0"/>
-                <a:t> manufactures and install bifacial PV panels</a:t>
+                <a:t> manufactures </a:t>
+              </a:r>
+              <a:r>
+                <a:rPr lang="en-GB" sz="1200"/>
+                <a:t>and installs </a:t>
+              </a:r>
+              <a:r>
+                <a:rPr lang="en-GB" sz="1200" dirty="0"/>
+                <a:t>bifacial PV panels</a:t>
               </a:r>
             </a:p>
           </p:txBody>

</xml_diff>

<commit_message>
update figure PV history and update gitignore
</commit_message>
<xml_diff>
--- a/Figures/Chapter_01/drawings/Fig_PV_history.pptx
+++ b/Figures/Chapter_01/drawings/Fig_PV_history.pptx
@@ -244,7 +244,7 @@
           <a:p>
             <a:fld id="{E53556A6-779D-436A-9960-E76995E88BDD}" type="datetimeFigureOut">
               <a:rPr lang="en-GB" smtClean="0"/>
-              <a:t>24/08/2022</a:t>
+              <a:t>15/09/2022</a:t>
             </a:fld>
             <a:endParaRPr lang="en-GB"/>
           </a:p>
@@ -414,7 +414,7 @@
           <a:p>
             <a:fld id="{E53556A6-779D-436A-9960-E76995E88BDD}" type="datetimeFigureOut">
               <a:rPr lang="en-GB" smtClean="0"/>
-              <a:t>24/08/2022</a:t>
+              <a:t>15/09/2022</a:t>
             </a:fld>
             <a:endParaRPr lang="en-GB"/>
           </a:p>
@@ -594,7 +594,7 @@
           <a:p>
             <a:fld id="{E53556A6-779D-436A-9960-E76995E88BDD}" type="datetimeFigureOut">
               <a:rPr lang="en-GB" smtClean="0"/>
-              <a:t>24/08/2022</a:t>
+              <a:t>15/09/2022</a:t>
             </a:fld>
             <a:endParaRPr lang="en-GB"/>
           </a:p>
@@ -764,7 +764,7 @@
           <a:p>
             <a:fld id="{E53556A6-779D-436A-9960-E76995E88BDD}" type="datetimeFigureOut">
               <a:rPr lang="en-GB" smtClean="0"/>
-              <a:t>24/08/2022</a:t>
+              <a:t>15/09/2022</a:t>
             </a:fld>
             <a:endParaRPr lang="en-GB"/>
           </a:p>
@@ -1008,7 +1008,7 @@
           <a:p>
             <a:fld id="{E53556A6-779D-436A-9960-E76995E88BDD}" type="datetimeFigureOut">
               <a:rPr lang="en-GB" smtClean="0"/>
-              <a:t>24/08/2022</a:t>
+              <a:t>15/09/2022</a:t>
             </a:fld>
             <a:endParaRPr lang="en-GB"/>
           </a:p>
@@ -1240,7 +1240,7 @@
           <a:p>
             <a:fld id="{E53556A6-779D-436A-9960-E76995E88BDD}" type="datetimeFigureOut">
               <a:rPr lang="en-GB" smtClean="0"/>
-              <a:t>24/08/2022</a:t>
+              <a:t>15/09/2022</a:t>
             </a:fld>
             <a:endParaRPr lang="en-GB"/>
           </a:p>
@@ -1607,7 +1607,7 @@
           <a:p>
             <a:fld id="{E53556A6-779D-436A-9960-E76995E88BDD}" type="datetimeFigureOut">
               <a:rPr lang="en-GB" smtClean="0"/>
-              <a:t>24/08/2022</a:t>
+              <a:t>15/09/2022</a:t>
             </a:fld>
             <a:endParaRPr lang="en-GB"/>
           </a:p>
@@ -1725,7 +1725,7 @@
           <a:p>
             <a:fld id="{E53556A6-779D-436A-9960-E76995E88BDD}" type="datetimeFigureOut">
               <a:rPr lang="en-GB" smtClean="0"/>
-              <a:t>24/08/2022</a:t>
+              <a:t>15/09/2022</a:t>
             </a:fld>
             <a:endParaRPr lang="en-GB"/>
           </a:p>
@@ -1820,7 +1820,7 @@
           <a:p>
             <a:fld id="{E53556A6-779D-436A-9960-E76995E88BDD}" type="datetimeFigureOut">
               <a:rPr lang="en-GB" smtClean="0"/>
-              <a:t>24/08/2022</a:t>
+              <a:t>15/09/2022</a:t>
             </a:fld>
             <a:endParaRPr lang="en-GB"/>
           </a:p>
@@ -2097,7 +2097,7 @@
           <a:p>
             <a:fld id="{E53556A6-779D-436A-9960-E76995E88BDD}" type="datetimeFigureOut">
               <a:rPr lang="en-GB" smtClean="0"/>
-              <a:t>24/08/2022</a:t>
+              <a:t>15/09/2022</a:t>
             </a:fld>
             <a:endParaRPr lang="en-GB"/>
           </a:p>
@@ -2354,7 +2354,7 @@
           <a:p>
             <a:fld id="{E53556A6-779D-436A-9960-E76995E88BDD}" type="datetimeFigureOut">
               <a:rPr lang="en-GB" smtClean="0"/>
-              <a:t>24/08/2022</a:t>
+              <a:t>15/09/2022</a:t>
             </a:fld>
             <a:endParaRPr lang="en-GB"/>
           </a:p>
@@ -2567,7 +2567,7 @@
           <a:p>
             <a:fld id="{E53556A6-779D-436A-9960-E76995E88BDD}" type="datetimeFigureOut">
               <a:rPr lang="en-GB" smtClean="0"/>
-              <a:t>24/08/2022</a:t>
+              <a:t>15/09/2022</a:t>
             </a:fld>
             <a:endParaRPr lang="en-GB"/>
           </a:p>
@@ -3114,9 +3114,9 @@
         <p:grpSpPr>
           <a:xfrm>
             <a:off x="131938" y="57908"/>
-            <a:ext cx="7323724" cy="11533442"/>
+            <a:ext cx="7323724" cy="11639217"/>
             <a:chOff x="131938" y="57908"/>
-            <a:chExt cx="7323724" cy="11533442"/>
+            <a:chExt cx="7323724" cy="11639217"/>
           </a:xfrm>
         </p:grpSpPr>
         <p:pic>
@@ -3141,7 +3141,7 @@
           </p:blipFill>
           <p:spPr>
             <a:xfrm>
-              <a:off x="5226350" y="9709391"/>
+              <a:off x="5007385" y="9815166"/>
               <a:ext cx="1847585" cy="1881959"/>
             </a:xfrm>
             <a:prstGeom prst="rect">
@@ -3325,7 +3325,7 @@
           <p:spPr>
             <a:xfrm>
               <a:off x="183263" y="169564"/>
-              <a:ext cx="3034617" cy="1384995"/>
+              <a:ext cx="3034617" cy="1569660"/>
             </a:xfrm>
             <a:prstGeom prst="rect">
               <a:avLst/>
@@ -3367,7 +3367,26 @@
                   <a:effectLst/>
                   <a:ea typeface="Times New Roman" panose="02020603050405020304" pitchFamily="18" charset="0"/>
                 </a:rPr>
-                <a:t>, that is, the conversion of photons to electrons. Becquerel placed two platinum electrodes in a container filled with an electrolyte and measured that the current flowing between the electrodes increased when the setup was exposed to sunlight.</a:t>
+                <a:t>, that is, t</a:t>
+              </a:r>
+              <a:r>
+                <a:rPr lang="en-GB" sz="1200" dirty="0">
+                  <a:solidFill>
+                    <a:srgbClr val="0E101A"/>
+                  </a:solidFill>
+                  <a:ea typeface="Times New Roman" panose="02020603050405020304" pitchFamily="18" charset="0"/>
+                </a:rPr>
+                <a:t>he conversion of absorbed light into electricity</a:t>
+              </a:r>
+              <a:r>
+                <a:rPr lang="en-GB" sz="1200" dirty="0">
+                  <a:solidFill>
+                    <a:srgbClr val="0E101A"/>
+                  </a:solidFill>
+                  <a:effectLst/>
+                  <a:ea typeface="Times New Roman" panose="02020603050405020304" pitchFamily="18" charset="0"/>
+                </a:rPr>
+                <a:t>. Becquerel placed two platinum electrodes in a container filled with an electrolyte and measured that the current flowing between the electrodes increased when the setup was exposed to sunlight.</a:t>
               </a:r>
               <a:endParaRPr lang="en-GB" sz="1200" dirty="0"/>
             </a:p>
@@ -3981,7 +4000,7 @@
           <p:spPr>
             <a:xfrm>
               <a:off x="4421045" y="3890087"/>
-              <a:ext cx="3034617" cy="1015663"/>
+              <a:ext cx="3034617" cy="830997"/>
             </a:xfrm>
             <a:prstGeom prst="rect">
               <a:avLst/>
@@ -3997,7 +4016,7 @@
               <a:pPr algn="just"/>
               <a:r>
                 <a:rPr lang="en-GB" sz="1200" dirty="0"/>
-                <a:t>Albert Einstein presents his quantum theory. Einstein explains the photoelectric effect by assuming that the light energy is being carried with quantized packages of energy that we call photons.</a:t>
+                <a:t>Albert Einstein presents his quantum theory. Einstein explains the photoelectric effect by assuming that light consists of quantized energy packages that we call  photons.  </a:t>
               </a:r>
             </a:p>
           </p:txBody>
@@ -4377,7 +4396,15 @@
               <a:pPr algn="just"/>
               <a:r>
                 <a:rPr lang="en-GB" sz="1200" dirty="0"/>
-                <a:t>William B. Shockley, the coinventor of the transistor, explains the principles of operation of the PN junction. PV solar cells are developed during this decade at Bell Labs.</a:t>
+                <a:t>William B. Shockley, the coinventor of the transistor, explains the principles of operation of the </a:t>
+              </a:r>
+              <a:r>
+                <a:rPr lang="en-GB" sz="1200" dirty="0" err="1"/>
+                <a:t>pn</a:t>
+              </a:r>
+              <a:r>
+                <a:rPr lang="en-GB" sz="1200" dirty="0"/>
+                <a:t> junction. PV solar cells are developed during this decade at Bell Labs.</a:t>
               </a:r>
             </a:p>
           </p:txBody>
@@ -4617,7 +4644,27 @@
                   <a:effectLst/>
                   <a:ea typeface="Times New Roman" panose="02020603050405020304" pitchFamily="18" charset="0"/>
                 </a:rPr>
-                <a:t>In the same year, a thin-film heterojunction solar cell based on Cu2S/</a:t>
+                <a:t>In the same year, a thin-film heterojunction solar cell based on Cu</a:t>
+              </a:r>
+              <a:r>
+                <a:rPr lang="en-GB" sz="1200" baseline="-25000" dirty="0">
+                  <a:solidFill>
+                    <a:srgbClr val="0E101A"/>
+                  </a:solidFill>
+                  <a:effectLst/>
+                  <a:ea typeface="Times New Roman" panose="02020603050405020304" pitchFamily="18" charset="0"/>
+                </a:rPr>
+                <a:t>2</a:t>
+              </a:r>
+              <a:r>
+                <a:rPr lang="en-GB" sz="1200" dirty="0">
+                  <a:solidFill>
+                    <a:srgbClr val="0E101A"/>
+                  </a:solidFill>
+                  <a:effectLst/>
+                  <a:ea typeface="Times New Roman" panose="02020603050405020304" pitchFamily="18" charset="0"/>
+                </a:rPr>
+                <a:t>S/</a:t>
               </a:r>
               <a:r>
                 <a:rPr lang="en-GB" sz="1200" dirty="0" err="1">
@@ -5176,8 +5223,8 @@
           </p:nvSpPr>
           <p:spPr>
             <a:xfrm>
-              <a:off x="4421044" y="8924800"/>
-              <a:ext cx="3034617" cy="1015663"/>
+              <a:off x="4421045" y="8924800"/>
+              <a:ext cx="2975383" cy="1015663"/>
             </a:xfrm>
             <a:prstGeom prst="rect">
               <a:avLst/>
@@ -5201,7 +5248,7 @@
               </a:r>
               <a:r>
                 <a:rPr lang="en-GB" sz="1200" dirty="0"/>
-                <a:t> published a scientific article in which they calculated the maximum theoretical efficiency that can be attained by a solar cell. The </a:t>
+                <a:t> developed the Detailed Balance theory for calculating the maximum theoretical efficiency that can be attained by a solar cell. The </a:t>
               </a:r>
               <a:r>
                 <a:rPr lang="en-GB" sz="1200" dirty="0" err="1"/>
@@ -5546,7 +5593,7 @@
           <a:graphicData uri="http://schemas.openxmlformats.org/presentationml/2006/ole">
             <mc:AlternateContent xmlns:mc="http://schemas.openxmlformats.org/markup-compatibility/2006">
               <mc:Choice xmlns:v="urn:schemas-microsoft-com:vml" Requires="v">
-                <p:oleObj spid="_x0000_s1044" name="Bitmap Image" r:id="rId7" imgW="5295960" imgH="5181480" progId="Paint.Picture">
+                <p:oleObj spid="_x0000_s1050" name="Bitmap Image" r:id="rId7" imgW="5295960" imgH="5181480" progId="Paint.Picture">
                   <p:embed/>
                 </p:oleObj>
               </mc:Choice>
@@ -5807,10 +5854,10 @@
         </p:nvGrpSpPr>
         <p:grpSpPr>
           <a:xfrm>
-            <a:off x="149127" y="207179"/>
-            <a:ext cx="7398187" cy="11166340"/>
-            <a:chOff x="149127" y="207179"/>
-            <a:chExt cx="7398187" cy="11166340"/>
+            <a:off x="136384" y="207179"/>
+            <a:ext cx="7410930" cy="11166340"/>
+            <a:chOff x="136384" y="207179"/>
+            <a:chExt cx="7410930" cy="11166340"/>
           </a:xfrm>
         </p:grpSpPr>
         <p:cxnSp>
@@ -5911,7 +5958,37 @@
                   <a:effectLst/>
                   <a:ea typeface="Times New Roman" panose="02020603050405020304" pitchFamily="18" charset="0"/>
                 </a:rPr>
-                <a:t> Institute in San Petersburg led by Alferov developed a solar cell based on gallium arsenide heterojunction. The main benefits of GaAs cells were their high efficiency and resistance to the ionizing radiation in space.</a:t>
+                <a:t> Institute in San Petersburg led by Alferov developed a solar cell based on </a:t>
+              </a:r>
+              <a:r>
+                <a:rPr lang="en-GB" sz="1200" dirty="0" err="1">
+                  <a:solidFill>
+                    <a:srgbClr val="0E101A"/>
+                  </a:solidFill>
+                  <a:effectLst/>
+                  <a:ea typeface="Times New Roman" panose="02020603050405020304" pitchFamily="18" charset="0"/>
+                </a:rPr>
+                <a:t>GaAlAs</a:t>
+              </a:r>
+              <a:r>
+                <a:rPr lang="en-GB" sz="1200">
+                  <a:solidFill>
+                    <a:srgbClr val="0E101A"/>
+                  </a:solidFill>
+                  <a:effectLst/>
+                  <a:ea typeface="Times New Roman" panose="02020603050405020304" pitchFamily="18" charset="0"/>
+                </a:rPr>
+                <a:t>/GaAs heterojunction</a:t>
+              </a:r>
+              <a:r>
+                <a:rPr lang="en-GB" sz="1200" dirty="0">
+                  <a:solidFill>
+                    <a:srgbClr val="0E101A"/>
+                  </a:solidFill>
+                  <a:effectLst/>
+                  <a:ea typeface="Times New Roman" panose="02020603050405020304" pitchFamily="18" charset="0"/>
+                </a:rPr>
+                <a:t>. The main benefits of GaAs cells were their high efficiency and resistance to the ionizing radiation in space.</a:t>
               </a:r>
             </a:p>
           </p:txBody>
@@ -6477,7 +6554,7 @@
               <a:pPr algn="just"/>
               <a:r>
                 <a:rPr lang="en-GB" sz="1200" dirty="0"/>
-                <a:t>Solar PV covers 20% of the annual electricity demand in California.</a:t>
+                <a:t>Solar PV covers 20% of the annual electricity demand in California (USA).</a:t>
               </a:r>
             </a:p>
           </p:txBody>
@@ -8795,8 +8872,8 @@
           </p:nvSpPr>
           <p:spPr>
             <a:xfrm>
-              <a:off x="158156" y="5636772"/>
-              <a:ext cx="3072394" cy="646331"/>
+              <a:off x="136384" y="5626326"/>
+              <a:ext cx="3123554" cy="646331"/>
             </a:xfrm>
             <a:prstGeom prst="rect">
               <a:avLst/>
@@ -8812,7 +8889,7 @@
               <a:pPr algn="just"/>
               <a:r>
                 <a:rPr lang="en-GB" sz="1200" dirty="0"/>
-                <a:t>Silicon solar cell attained efficiency &gt;20% under standard sunlight (UNSW, Australia) and &gt;25% under 200X concentration (Stanford)</a:t>
+                <a:t>Silicon solar cell attained efficiency &gt;20% under standard sunlight (UNSW, Australia) and &gt;25% under 200X concentration (Stanford Univ., USA)</a:t>
               </a:r>
             </a:p>
           </p:txBody>

</xml_diff>

<commit_message>
update figure with PV history
</commit_message>
<xml_diff>
--- a/Figures/Chapter_01/drawings/Fig_PV_history.pptx
+++ b/Figures/Chapter_01/drawings/Fig_PV_history.pptx
@@ -244,7 +244,7 @@
           <a:p>
             <a:fld id="{E53556A6-779D-436A-9960-E76995E88BDD}" type="datetimeFigureOut">
               <a:rPr lang="en-GB" smtClean="0"/>
-              <a:t>15/09/2022</a:t>
+              <a:t>30/09/2022</a:t>
             </a:fld>
             <a:endParaRPr lang="en-GB"/>
           </a:p>
@@ -414,7 +414,7 @@
           <a:p>
             <a:fld id="{E53556A6-779D-436A-9960-E76995E88BDD}" type="datetimeFigureOut">
               <a:rPr lang="en-GB" smtClean="0"/>
-              <a:t>15/09/2022</a:t>
+              <a:t>30/09/2022</a:t>
             </a:fld>
             <a:endParaRPr lang="en-GB"/>
           </a:p>
@@ -594,7 +594,7 @@
           <a:p>
             <a:fld id="{E53556A6-779D-436A-9960-E76995E88BDD}" type="datetimeFigureOut">
               <a:rPr lang="en-GB" smtClean="0"/>
-              <a:t>15/09/2022</a:t>
+              <a:t>30/09/2022</a:t>
             </a:fld>
             <a:endParaRPr lang="en-GB"/>
           </a:p>
@@ -764,7 +764,7 @@
           <a:p>
             <a:fld id="{E53556A6-779D-436A-9960-E76995E88BDD}" type="datetimeFigureOut">
               <a:rPr lang="en-GB" smtClean="0"/>
-              <a:t>15/09/2022</a:t>
+              <a:t>30/09/2022</a:t>
             </a:fld>
             <a:endParaRPr lang="en-GB"/>
           </a:p>
@@ -1008,7 +1008,7 @@
           <a:p>
             <a:fld id="{E53556A6-779D-436A-9960-E76995E88BDD}" type="datetimeFigureOut">
               <a:rPr lang="en-GB" smtClean="0"/>
-              <a:t>15/09/2022</a:t>
+              <a:t>30/09/2022</a:t>
             </a:fld>
             <a:endParaRPr lang="en-GB"/>
           </a:p>
@@ -1240,7 +1240,7 @@
           <a:p>
             <a:fld id="{E53556A6-779D-436A-9960-E76995E88BDD}" type="datetimeFigureOut">
               <a:rPr lang="en-GB" smtClean="0"/>
-              <a:t>15/09/2022</a:t>
+              <a:t>30/09/2022</a:t>
             </a:fld>
             <a:endParaRPr lang="en-GB"/>
           </a:p>
@@ -1607,7 +1607,7 @@
           <a:p>
             <a:fld id="{E53556A6-779D-436A-9960-E76995E88BDD}" type="datetimeFigureOut">
               <a:rPr lang="en-GB" smtClean="0"/>
-              <a:t>15/09/2022</a:t>
+              <a:t>30/09/2022</a:t>
             </a:fld>
             <a:endParaRPr lang="en-GB"/>
           </a:p>
@@ -1725,7 +1725,7 @@
           <a:p>
             <a:fld id="{E53556A6-779D-436A-9960-E76995E88BDD}" type="datetimeFigureOut">
               <a:rPr lang="en-GB" smtClean="0"/>
-              <a:t>15/09/2022</a:t>
+              <a:t>30/09/2022</a:t>
             </a:fld>
             <a:endParaRPr lang="en-GB"/>
           </a:p>
@@ -1820,7 +1820,7 @@
           <a:p>
             <a:fld id="{E53556A6-779D-436A-9960-E76995E88BDD}" type="datetimeFigureOut">
               <a:rPr lang="en-GB" smtClean="0"/>
-              <a:t>15/09/2022</a:t>
+              <a:t>30/09/2022</a:t>
             </a:fld>
             <a:endParaRPr lang="en-GB"/>
           </a:p>
@@ -2097,7 +2097,7 @@
           <a:p>
             <a:fld id="{E53556A6-779D-436A-9960-E76995E88BDD}" type="datetimeFigureOut">
               <a:rPr lang="en-GB" smtClean="0"/>
-              <a:t>15/09/2022</a:t>
+              <a:t>30/09/2022</a:t>
             </a:fld>
             <a:endParaRPr lang="en-GB"/>
           </a:p>
@@ -2354,7 +2354,7 @@
           <a:p>
             <a:fld id="{E53556A6-779D-436A-9960-E76995E88BDD}" type="datetimeFigureOut">
               <a:rPr lang="en-GB" smtClean="0"/>
-              <a:t>15/09/2022</a:t>
+              <a:t>30/09/2022</a:t>
             </a:fld>
             <a:endParaRPr lang="en-GB"/>
           </a:p>
@@ -2567,7 +2567,7 @@
           <a:p>
             <a:fld id="{E53556A6-779D-436A-9960-E76995E88BDD}" type="datetimeFigureOut">
               <a:rPr lang="en-GB" smtClean="0"/>
-              <a:t>15/09/2022</a:t>
+              <a:t>30/09/2022</a:t>
             </a:fld>
             <a:endParaRPr lang="en-GB"/>
           </a:p>
@@ -5593,7 +5593,7 @@
           <a:graphicData uri="http://schemas.openxmlformats.org/presentationml/2006/ole">
             <mc:AlternateContent xmlns:mc="http://schemas.openxmlformats.org/markup-compatibility/2006">
               <mc:Choice xmlns:v="urn:schemas-microsoft-com:vml" Requires="v">
-                <p:oleObj spid="_x0000_s1050" name="Bitmap Image" r:id="rId7" imgW="5295960" imgH="5181480" progId="Paint.Picture">
+                <p:oleObj spid="_x0000_s1051" name="Bitmap Image" r:id="rId7" imgW="5295960" imgH="5181480" progId="Paint.Picture">
                   <p:embed/>
                 </p:oleObj>
               </mc:Choice>
@@ -5842,10 +5842,10 @@
       </p:pic>
       <p:grpSp>
         <p:nvGrpSpPr>
-          <p:cNvPr id="2" name="Group 1">
+          <p:cNvPr id="6" name="Group 5">
             <a:extLst>
               <a:ext uri="{FF2B5EF4-FFF2-40B4-BE49-F238E27FC236}">
-                <a16:creationId xmlns:a16="http://schemas.microsoft.com/office/drawing/2014/main" id="{F1624004-0B1E-4B60-8A9A-C4F8C764A846}"/>
+                <a16:creationId xmlns:a16="http://schemas.microsoft.com/office/drawing/2014/main" id="{70EE94F3-D2E1-454F-8B8D-D66305DBDD27}"/>
               </a:ext>
             </a:extLst>
           </p:cNvPr>
@@ -6419,7 +6419,7 @@
           </p:nvGrpSpPr>
           <p:grpSpPr>
             <a:xfrm>
-              <a:off x="3684151" y="10479152"/>
+              <a:off x="3684151" y="10655614"/>
               <a:ext cx="684000" cy="180000"/>
               <a:chOff x="3684151" y="704483"/>
               <a:chExt cx="684000" cy="180000"/>
@@ -6537,7 +6537,7 @@
           </p:nvSpPr>
           <p:spPr>
             <a:xfrm>
-              <a:off x="4421046" y="10253711"/>
+              <a:off x="4421046" y="10430173"/>
               <a:ext cx="3034616" cy="461665"/>
             </a:xfrm>
             <a:prstGeom prst="rect">
@@ -6573,7 +6573,7 @@
           </p:nvSpPr>
           <p:spPr>
             <a:xfrm>
-              <a:off x="3844685" y="10297641"/>
+              <a:off x="3844685" y="10474103"/>
               <a:ext cx="556925" cy="276999"/>
             </a:xfrm>
             <a:prstGeom prst="rect">
@@ -6986,7 +6986,7 @@
           </p:nvGrpSpPr>
           <p:grpSpPr>
             <a:xfrm>
-              <a:off x="3687693" y="10812304"/>
+              <a:off x="3687693" y="10988766"/>
               <a:ext cx="684000" cy="180000"/>
               <a:chOff x="3684151" y="704483"/>
               <a:chExt cx="684000" cy="180000"/>
@@ -7104,7 +7104,7 @@
           </p:nvSpPr>
           <p:spPr>
             <a:xfrm>
-              <a:off x="4424588" y="10743292"/>
+              <a:off x="4424588" y="10919754"/>
               <a:ext cx="3034616" cy="276999"/>
             </a:xfrm>
             <a:prstGeom prst="rect">
@@ -7140,7 +7140,7 @@
           </p:nvSpPr>
           <p:spPr>
             <a:xfrm>
-              <a:off x="3848227" y="10630793"/>
+              <a:off x="3848227" y="10807255"/>
               <a:ext cx="556925" cy="276999"/>
             </a:xfrm>
             <a:prstGeom prst="rect">
@@ -8947,209 +8947,410 @@
             </a:extLst>
           </p:spPr>
         </p:pic>
+        <p:grpSp>
+          <p:nvGrpSpPr>
+            <p:cNvPr id="118" name="Group 117">
+              <a:extLst>
+                <a:ext uri="{FF2B5EF4-FFF2-40B4-BE49-F238E27FC236}">
+                  <a16:creationId xmlns:a16="http://schemas.microsoft.com/office/drawing/2014/main" id="{C00EEAF3-A828-4C2C-B4FE-73BA082E3BE3}"/>
+                </a:ext>
+              </a:extLst>
+            </p:cNvPr>
+            <p:cNvGrpSpPr/>
+            <p:nvPr/>
+          </p:nvGrpSpPr>
+          <p:grpSpPr>
+            <a:xfrm rot="10800000">
+              <a:off x="3181845" y="9117234"/>
+              <a:ext cx="684000" cy="180000"/>
+              <a:chOff x="3684151" y="704483"/>
+              <a:chExt cx="684000" cy="180000"/>
+            </a:xfrm>
+          </p:grpSpPr>
+          <p:sp>
+            <p:nvSpPr>
+              <p:cNvPr id="119" name="Oval 118">
+                <a:extLst>
+                  <a:ext uri="{FF2B5EF4-FFF2-40B4-BE49-F238E27FC236}">
+                    <a16:creationId xmlns:a16="http://schemas.microsoft.com/office/drawing/2014/main" id="{32DFAFE3-5744-497A-AE7A-28D6C282FB16}"/>
+                  </a:ext>
+                </a:extLst>
+              </p:cNvPr>
+              <p:cNvSpPr/>
+              <p:nvPr/>
+            </p:nvSpPr>
+            <p:spPr>
+              <a:xfrm>
+                <a:off x="3684151" y="704483"/>
+                <a:ext cx="180000" cy="180000"/>
+              </a:xfrm>
+              <a:prstGeom prst="ellipse">
+                <a:avLst/>
+              </a:prstGeom>
+              <a:solidFill>
+                <a:schemeClr val="bg1"/>
+              </a:solidFill>
+              <a:ln w="38100">
+                <a:solidFill>
+                  <a:srgbClr val="C00000"/>
+                </a:solidFill>
+              </a:ln>
+            </p:spPr>
+            <p:style>
+              <a:lnRef idx="2">
+                <a:schemeClr val="accent1">
+                  <a:shade val="50000"/>
+                </a:schemeClr>
+              </a:lnRef>
+              <a:fillRef idx="1">
+                <a:schemeClr val="accent1"/>
+              </a:fillRef>
+              <a:effectRef idx="0">
+                <a:schemeClr val="accent1"/>
+              </a:effectRef>
+              <a:fontRef idx="minor">
+                <a:schemeClr val="lt1"/>
+              </a:fontRef>
+            </p:style>
+            <p:txBody>
+              <a:bodyPr rtlCol="0" anchor="ctr"/>
+              <a:lstStyle/>
+              <a:p>
+                <a:pPr algn="ctr"/>
+                <a:endParaRPr lang="en-GB"/>
+              </a:p>
+            </p:txBody>
+          </p:sp>
+          <p:cxnSp>
+            <p:nvCxnSpPr>
+              <p:cNvPr id="120" name="Straight Connector 119">
+                <a:extLst>
+                  <a:ext uri="{FF2B5EF4-FFF2-40B4-BE49-F238E27FC236}">
+                    <a16:creationId xmlns:a16="http://schemas.microsoft.com/office/drawing/2014/main" id="{63C5ADFA-613D-4A9C-8A62-7A8E39E28847}"/>
+                  </a:ext>
+                </a:extLst>
+              </p:cNvPr>
+              <p:cNvCxnSpPr>
+                <a:cxnSpLocks/>
+              </p:cNvCxnSpPr>
+              <p:nvPr/>
+            </p:nvCxnSpPr>
+            <p:spPr>
+              <a:xfrm>
+                <a:off x="3864151" y="794483"/>
+                <a:ext cx="504000" cy="0"/>
+              </a:xfrm>
+              <a:prstGeom prst="line">
+                <a:avLst/>
+              </a:prstGeom>
+              <a:ln w="38100">
+                <a:solidFill>
+                  <a:srgbClr val="C00000"/>
+                </a:solidFill>
+              </a:ln>
+            </p:spPr>
+            <p:style>
+              <a:lnRef idx="1">
+                <a:schemeClr val="accent1"/>
+              </a:lnRef>
+              <a:fillRef idx="0">
+                <a:schemeClr val="accent1"/>
+              </a:fillRef>
+              <a:effectRef idx="0">
+                <a:schemeClr val="accent1"/>
+              </a:effectRef>
+              <a:fontRef idx="minor">
+                <a:schemeClr val="tx1"/>
+              </a:fontRef>
+            </p:style>
+          </p:cxnSp>
+        </p:grpSp>
+        <p:sp>
+          <p:nvSpPr>
+            <p:cNvPr id="121" name="TextBox 120">
+              <a:extLst>
+                <a:ext uri="{FF2B5EF4-FFF2-40B4-BE49-F238E27FC236}">
+                  <a16:creationId xmlns:a16="http://schemas.microsoft.com/office/drawing/2014/main" id="{54BA063E-76E5-42C6-98DC-8737277EA9AC}"/>
+                </a:ext>
+              </a:extLst>
+            </p:cNvPr>
+            <p:cNvSpPr txBox="1"/>
+            <p:nvPr/>
+          </p:nvSpPr>
+          <p:spPr>
+            <a:xfrm>
+              <a:off x="3223855" y="8942772"/>
+              <a:ext cx="556925" cy="276999"/>
+            </a:xfrm>
+            <a:prstGeom prst="rect">
+              <a:avLst/>
+            </a:prstGeom>
+            <a:noFill/>
+          </p:spPr>
+          <p:txBody>
+            <a:bodyPr wrap="square" rtlCol="0">
+              <a:spAutoFit/>
+            </a:bodyPr>
+            <a:lstStyle/>
+            <a:p>
+              <a:pPr algn="just"/>
+              <a:r>
+                <a:rPr lang="en-GB" sz="1200" dirty="0">
+                  <a:solidFill>
+                    <a:srgbClr val="C00000"/>
+                  </a:solidFill>
+                  <a:effectLst/>
+                  <a:ea typeface="Times New Roman" panose="02020603050405020304" pitchFamily="18" charset="0"/>
+                </a:rPr>
+                <a:t>1999</a:t>
+              </a:r>
+              <a:endParaRPr lang="en-GB" sz="1200" dirty="0">
+                <a:solidFill>
+                  <a:srgbClr val="C00000"/>
+                </a:solidFill>
+              </a:endParaRPr>
+            </a:p>
+          </p:txBody>
+        </p:sp>
+        <p:grpSp>
+          <p:nvGrpSpPr>
+            <p:cNvPr id="122" name="Group 121">
+              <a:extLst>
+                <a:ext uri="{FF2B5EF4-FFF2-40B4-BE49-F238E27FC236}">
+                  <a16:creationId xmlns:a16="http://schemas.microsoft.com/office/drawing/2014/main" id="{51185A89-3D97-4EA6-B9FD-3AC0BB79CAF3}"/>
+                </a:ext>
+              </a:extLst>
+            </p:cNvPr>
+            <p:cNvGrpSpPr/>
+            <p:nvPr/>
+          </p:nvGrpSpPr>
+          <p:grpSpPr>
+            <a:xfrm rot="10800000">
+              <a:off x="3189867" y="10184031"/>
+              <a:ext cx="684000" cy="180000"/>
+              <a:chOff x="3684151" y="704483"/>
+              <a:chExt cx="684000" cy="180000"/>
+            </a:xfrm>
+          </p:grpSpPr>
+          <p:sp>
+            <p:nvSpPr>
+              <p:cNvPr id="123" name="Oval 122">
+                <a:extLst>
+                  <a:ext uri="{FF2B5EF4-FFF2-40B4-BE49-F238E27FC236}">
+                    <a16:creationId xmlns:a16="http://schemas.microsoft.com/office/drawing/2014/main" id="{5608DAC3-7C5E-441C-A411-A3D486C5E6B1}"/>
+                  </a:ext>
+                </a:extLst>
+              </p:cNvPr>
+              <p:cNvSpPr/>
+              <p:nvPr/>
+            </p:nvSpPr>
+            <p:spPr>
+              <a:xfrm>
+                <a:off x="3684151" y="704483"/>
+                <a:ext cx="180000" cy="180000"/>
+              </a:xfrm>
+              <a:prstGeom prst="ellipse">
+                <a:avLst/>
+              </a:prstGeom>
+              <a:solidFill>
+                <a:schemeClr val="bg1"/>
+              </a:solidFill>
+              <a:ln w="38100">
+                <a:solidFill>
+                  <a:srgbClr val="C00000"/>
+                </a:solidFill>
+              </a:ln>
+            </p:spPr>
+            <p:style>
+              <a:lnRef idx="2">
+                <a:schemeClr val="accent1">
+                  <a:shade val="50000"/>
+                </a:schemeClr>
+              </a:lnRef>
+              <a:fillRef idx="1">
+                <a:schemeClr val="accent1"/>
+              </a:fillRef>
+              <a:effectRef idx="0">
+                <a:schemeClr val="accent1"/>
+              </a:effectRef>
+              <a:fontRef idx="minor">
+                <a:schemeClr val="lt1"/>
+              </a:fontRef>
+            </p:style>
+            <p:txBody>
+              <a:bodyPr rtlCol="0" anchor="ctr"/>
+              <a:lstStyle/>
+              <a:p>
+                <a:pPr algn="ctr"/>
+                <a:endParaRPr lang="en-GB"/>
+              </a:p>
+            </p:txBody>
+          </p:sp>
+          <p:cxnSp>
+            <p:nvCxnSpPr>
+              <p:cNvPr id="124" name="Straight Connector 123">
+                <a:extLst>
+                  <a:ext uri="{FF2B5EF4-FFF2-40B4-BE49-F238E27FC236}">
+                    <a16:creationId xmlns:a16="http://schemas.microsoft.com/office/drawing/2014/main" id="{1E265271-7F26-4DEB-B32D-2E15DCC8F1E9}"/>
+                  </a:ext>
+                </a:extLst>
+              </p:cNvPr>
+              <p:cNvCxnSpPr>
+                <a:cxnSpLocks/>
+              </p:cNvCxnSpPr>
+              <p:nvPr/>
+            </p:nvCxnSpPr>
+            <p:spPr>
+              <a:xfrm>
+                <a:off x="3864151" y="794483"/>
+                <a:ext cx="504000" cy="0"/>
+              </a:xfrm>
+              <a:prstGeom prst="line">
+                <a:avLst/>
+              </a:prstGeom>
+              <a:ln w="38100">
+                <a:solidFill>
+                  <a:srgbClr val="C00000"/>
+                </a:solidFill>
+              </a:ln>
+            </p:spPr>
+            <p:style>
+              <a:lnRef idx="1">
+                <a:schemeClr val="accent1"/>
+              </a:lnRef>
+              <a:fillRef idx="0">
+                <a:schemeClr val="accent1"/>
+              </a:fillRef>
+              <a:effectRef idx="0">
+                <a:schemeClr val="accent1"/>
+              </a:effectRef>
+              <a:fontRef idx="minor">
+                <a:schemeClr val="tx1"/>
+              </a:fontRef>
+            </p:style>
+          </p:cxnSp>
+        </p:grpSp>
+        <p:sp>
+          <p:nvSpPr>
+            <p:cNvPr id="125" name="TextBox 124">
+              <a:extLst>
+                <a:ext uri="{FF2B5EF4-FFF2-40B4-BE49-F238E27FC236}">
+                  <a16:creationId xmlns:a16="http://schemas.microsoft.com/office/drawing/2014/main" id="{A479323D-7E79-4CF8-AC4C-CBFC2257B8BF}"/>
+                </a:ext>
+              </a:extLst>
+            </p:cNvPr>
+            <p:cNvSpPr txBox="1"/>
+            <p:nvPr/>
+          </p:nvSpPr>
+          <p:spPr>
+            <a:xfrm>
+              <a:off x="3231877" y="10009569"/>
+              <a:ext cx="556925" cy="276999"/>
+            </a:xfrm>
+            <a:prstGeom prst="rect">
+              <a:avLst/>
+            </a:prstGeom>
+            <a:noFill/>
+          </p:spPr>
+          <p:txBody>
+            <a:bodyPr wrap="square" rtlCol="0">
+              <a:spAutoFit/>
+            </a:bodyPr>
+            <a:lstStyle/>
+            <a:p>
+              <a:pPr algn="just"/>
+              <a:r>
+                <a:rPr lang="en-GB" sz="1200" dirty="0">
+                  <a:solidFill>
+                    <a:srgbClr val="C00000"/>
+                  </a:solidFill>
+                </a:rPr>
+                <a:t>2015</a:t>
+              </a:r>
+            </a:p>
+          </p:txBody>
+        </p:sp>
+        <p:sp>
+          <p:nvSpPr>
+            <p:cNvPr id="127" name="TextBox 126">
+              <a:extLst>
+                <a:ext uri="{FF2B5EF4-FFF2-40B4-BE49-F238E27FC236}">
+                  <a16:creationId xmlns:a16="http://schemas.microsoft.com/office/drawing/2014/main" id="{CBBDF616-E433-4F89-AEED-D1C1D3FF271C}"/>
+                </a:ext>
+              </a:extLst>
+            </p:cNvPr>
+            <p:cNvSpPr txBox="1"/>
+            <p:nvPr/>
+          </p:nvSpPr>
+          <p:spPr>
+            <a:xfrm>
+              <a:off x="466650" y="9053491"/>
+              <a:ext cx="2698146" cy="461665"/>
+            </a:xfrm>
+            <a:prstGeom prst="rect">
+              <a:avLst/>
+            </a:prstGeom>
+            <a:noFill/>
+          </p:spPr>
+          <p:txBody>
+            <a:bodyPr wrap="square" rtlCol="0">
+              <a:spAutoFit/>
+            </a:bodyPr>
+            <a:lstStyle/>
+            <a:p>
+              <a:pPr algn="just"/>
+              <a:r>
+                <a:rPr lang="en-GB" sz="1200" dirty="0"/>
+                <a:t>First silicon solar cell with 25% efficiency (PERL design) (UNSW, Australia) </a:t>
+              </a:r>
+            </a:p>
+          </p:txBody>
+        </p:sp>
+        <p:sp>
+          <p:nvSpPr>
+            <p:cNvPr id="128" name="TextBox 127">
+              <a:extLst>
+                <a:ext uri="{FF2B5EF4-FFF2-40B4-BE49-F238E27FC236}">
+                  <a16:creationId xmlns:a16="http://schemas.microsoft.com/office/drawing/2014/main" id="{3AA83768-F9B0-421F-9A77-C264E216EC14}"/>
+                </a:ext>
+              </a:extLst>
+            </p:cNvPr>
+            <p:cNvSpPr txBox="1"/>
+            <p:nvPr/>
+          </p:nvSpPr>
+          <p:spPr>
+            <a:xfrm>
+              <a:off x="240306" y="10022594"/>
+              <a:ext cx="3034617" cy="646331"/>
+            </a:xfrm>
+            <a:prstGeom prst="rect">
+              <a:avLst/>
+            </a:prstGeom>
+            <a:noFill/>
+          </p:spPr>
+          <p:txBody>
+            <a:bodyPr wrap="square" rtlCol="0">
+              <a:spAutoFit/>
+            </a:bodyPr>
+            <a:lstStyle/>
+            <a:p>
+              <a:pPr algn="just"/>
+              <a:r>
+                <a:rPr lang="en-GB" sz="1200" dirty="0"/>
+                <a:t>The race for high-efficient commercial silicon cells results in innovative cell architectures (IBC, </a:t>
+              </a:r>
+              <a:r>
+                <a:rPr lang="en-GB" sz="1200" dirty="0" err="1"/>
+                <a:t>TOPCon</a:t>
+              </a:r>
+              <a:r>
+                <a:rPr lang="en-GB" sz="1200" dirty="0"/>
+                <a:t>) with efficiency &gt;25%</a:t>
+              </a:r>
+            </a:p>
+          </p:txBody>
+        </p:sp>
       </p:grpSp>
-      <p:sp>
-        <p:nvSpPr>
-          <p:cNvPr id="90" name="TextBox 89">
-            <a:extLst>
-              <a:ext uri="{FF2B5EF4-FFF2-40B4-BE49-F238E27FC236}">
-                <a16:creationId xmlns:a16="http://schemas.microsoft.com/office/drawing/2014/main" id="{F3ECF042-FFAB-4819-A01F-F6D8EF5D3763}"/>
-              </a:ext>
-            </a:extLst>
-          </p:cNvPr>
-          <p:cNvSpPr txBox="1"/>
-          <p:nvPr/>
-        </p:nvSpPr>
-        <p:spPr>
-          <a:xfrm>
-            <a:off x="-3622329" y="4114612"/>
-            <a:ext cx="2465323" cy="276999"/>
-          </a:xfrm>
-          <a:prstGeom prst="rect">
-            <a:avLst/>
-          </a:prstGeom>
-          <a:noFill/>
-        </p:spPr>
-        <p:txBody>
-          <a:bodyPr wrap="square" rtlCol="0">
-            <a:spAutoFit/>
-          </a:bodyPr>
-          <a:lstStyle/>
-          <a:p>
-            <a:pPr algn="just"/>
-            <a:r>
-              <a:rPr lang="en-GB" sz="1200" dirty="0">
-                <a:solidFill>
-                  <a:srgbClr val="0070C0"/>
-                </a:solidFill>
-                <a:latin typeface="Calibri" panose="020F0502020204030204" pitchFamily="34" charset="0"/>
-                <a:ea typeface="Times New Roman" panose="02020603050405020304" pitchFamily="18" charset="0"/>
-              </a:rPr>
-              <a:t>Primera thin film</a:t>
-            </a:r>
-            <a:endParaRPr lang="en-GB" sz="1200" dirty="0">
-              <a:solidFill>
-                <a:srgbClr val="0070C0"/>
-              </a:solidFill>
-              <a:effectLst/>
-              <a:latin typeface="Times New Roman" panose="02020603050405020304" pitchFamily="18" charset="0"/>
-              <a:ea typeface="Times New Roman" panose="02020603050405020304" pitchFamily="18" charset="0"/>
-            </a:endParaRPr>
-          </a:p>
-        </p:txBody>
-      </p:sp>
-      <p:sp>
-        <p:nvSpPr>
-          <p:cNvPr id="98" name="TextBox 97">
-            <a:extLst>
-              <a:ext uri="{FF2B5EF4-FFF2-40B4-BE49-F238E27FC236}">
-                <a16:creationId xmlns:a16="http://schemas.microsoft.com/office/drawing/2014/main" id="{9CC38EF9-CB7D-429F-B6C7-C5ECABAD6EFD}"/>
-              </a:ext>
-            </a:extLst>
-          </p:cNvPr>
-          <p:cNvSpPr txBox="1"/>
-          <p:nvPr/>
-        </p:nvSpPr>
-        <p:spPr>
-          <a:xfrm>
-            <a:off x="-3591490" y="4477113"/>
-            <a:ext cx="2465323" cy="276999"/>
-          </a:xfrm>
-          <a:prstGeom prst="rect">
-            <a:avLst/>
-          </a:prstGeom>
-          <a:noFill/>
-        </p:spPr>
-        <p:txBody>
-          <a:bodyPr wrap="square" rtlCol="0">
-            <a:spAutoFit/>
-          </a:bodyPr>
-          <a:lstStyle/>
-          <a:p>
-            <a:pPr algn="just"/>
-            <a:r>
-              <a:rPr lang="en-GB" sz="1200" dirty="0">
-                <a:solidFill>
-                  <a:srgbClr val="0070C0"/>
-                </a:solidFill>
-                <a:latin typeface="Calibri" panose="020F0502020204030204" pitchFamily="34" charset="0"/>
-                <a:ea typeface="Times New Roman" panose="02020603050405020304" pitchFamily="18" charset="0"/>
-              </a:rPr>
-              <a:t>Avion solar</a:t>
-            </a:r>
-            <a:endParaRPr lang="en-GB" sz="1200" dirty="0">
-              <a:solidFill>
-                <a:srgbClr val="0070C0"/>
-              </a:solidFill>
-              <a:effectLst/>
-              <a:latin typeface="Times New Roman" panose="02020603050405020304" pitchFamily="18" charset="0"/>
-              <a:ea typeface="Times New Roman" panose="02020603050405020304" pitchFamily="18" charset="0"/>
-            </a:endParaRPr>
-          </a:p>
-        </p:txBody>
-      </p:sp>
-      <p:sp>
-        <p:nvSpPr>
-          <p:cNvPr id="109" name="TextBox 108">
-            <a:extLst>
-              <a:ext uri="{FF2B5EF4-FFF2-40B4-BE49-F238E27FC236}">
-                <a16:creationId xmlns:a16="http://schemas.microsoft.com/office/drawing/2014/main" id="{720EAEF6-E3A8-44E8-9A3F-7DBDA8737760}"/>
-              </a:ext>
-            </a:extLst>
-          </p:cNvPr>
-          <p:cNvSpPr txBox="1"/>
-          <p:nvPr/>
-        </p:nvSpPr>
-        <p:spPr>
-          <a:xfrm>
-            <a:off x="-3549207" y="4901711"/>
-            <a:ext cx="2465323" cy="276999"/>
-          </a:xfrm>
-          <a:prstGeom prst="rect">
-            <a:avLst/>
-          </a:prstGeom>
-          <a:noFill/>
-        </p:spPr>
-        <p:txBody>
-          <a:bodyPr wrap="square" rtlCol="0">
-            <a:spAutoFit/>
-          </a:bodyPr>
-          <a:lstStyle/>
-          <a:p>
-            <a:pPr algn="just"/>
-            <a:r>
-              <a:rPr lang="en-GB" sz="1200" dirty="0">
-                <a:solidFill>
-                  <a:srgbClr val="0070C0"/>
-                </a:solidFill>
-                <a:latin typeface="Calibri" panose="020F0502020204030204" pitchFamily="34" charset="0"/>
-                <a:ea typeface="Times New Roman" panose="02020603050405020304" pitchFamily="18" charset="0"/>
-              </a:rPr>
-              <a:t>Solar race / solar decathlon</a:t>
-            </a:r>
-            <a:endParaRPr lang="en-GB" sz="1200" dirty="0">
-              <a:solidFill>
-                <a:srgbClr val="0070C0"/>
-              </a:solidFill>
-              <a:effectLst/>
-              <a:latin typeface="Times New Roman" panose="02020603050405020304" pitchFamily="18" charset="0"/>
-              <a:ea typeface="Times New Roman" panose="02020603050405020304" pitchFamily="18" charset="0"/>
-            </a:endParaRPr>
-          </a:p>
-        </p:txBody>
-      </p:sp>
-      <p:sp>
-        <p:nvSpPr>
-          <p:cNvPr id="115" name="Rectangle 114">
-            <a:extLst>
-              <a:ext uri="{FF2B5EF4-FFF2-40B4-BE49-F238E27FC236}">
-                <a16:creationId xmlns:a16="http://schemas.microsoft.com/office/drawing/2014/main" id="{AAB4C778-B81E-46D8-9864-2D5288F0F481}"/>
-              </a:ext>
-            </a:extLst>
-          </p:cNvPr>
-          <p:cNvSpPr/>
-          <p:nvPr/>
-        </p:nvSpPr>
-        <p:spPr>
-          <a:xfrm>
-            <a:off x="-2545909" y="6245327"/>
-            <a:ext cx="900000" cy="900000"/>
-          </a:xfrm>
-          <a:prstGeom prst="rect">
-            <a:avLst/>
-          </a:prstGeom>
-          <a:solidFill>
-            <a:srgbClr val="B31F20"/>
-          </a:solidFill>
-          <a:ln>
-            <a:noFill/>
-          </a:ln>
-        </p:spPr>
-        <p:style>
-          <a:lnRef idx="2">
-            <a:schemeClr val="accent1">
-              <a:shade val="50000"/>
-            </a:schemeClr>
-          </a:lnRef>
-          <a:fillRef idx="1">
-            <a:schemeClr val="accent1"/>
-          </a:fillRef>
-          <a:effectRef idx="0">
-            <a:schemeClr val="accent1"/>
-          </a:effectRef>
-          <a:fontRef idx="minor">
-            <a:schemeClr val="lt1"/>
-          </a:fontRef>
-        </p:style>
-        <p:txBody>
-          <a:bodyPr rtlCol="0" anchor="ctr"/>
-          <a:lstStyle/>
-          <a:p>
-            <a:pPr algn="ctr"/>
-            <a:endParaRPr lang="en-GB"/>
-          </a:p>
-        </p:txBody>
-      </p:sp>
     </p:spTree>
     <p:extLst>
       <p:ext uri="{BB962C8B-B14F-4D97-AF65-F5344CB8AC3E}">

</xml_diff>

<commit_message>
update history figures on chapter 1
</commit_message>
<xml_diff>
--- a/Figures/Chapter_01/drawings/Fig_PV_history.pptx
+++ b/Figures/Chapter_01/drawings/Fig_PV_history.pptx
@@ -244,7 +244,7 @@
           <a:p>
             <a:fld id="{E53556A6-779D-436A-9960-E76995E88BDD}" type="datetimeFigureOut">
               <a:rPr lang="en-GB" smtClean="0"/>
-              <a:t>30/09/2022</a:t>
+              <a:t>03/08/2023</a:t>
             </a:fld>
             <a:endParaRPr lang="en-GB"/>
           </a:p>
@@ -414,7 +414,7 @@
           <a:p>
             <a:fld id="{E53556A6-779D-436A-9960-E76995E88BDD}" type="datetimeFigureOut">
               <a:rPr lang="en-GB" smtClean="0"/>
-              <a:t>30/09/2022</a:t>
+              <a:t>03/08/2023</a:t>
             </a:fld>
             <a:endParaRPr lang="en-GB"/>
           </a:p>
@@ -594,7 +594,7 @@
           <a:p>
             <a:fld id="{E53556A6-779D-436A-9960-E76995E88BDD}" type="datetimeFigureOut">
               <a:rPr lang="en-GB" smtClean="0"/>
-              <a:t>30/09/2022</a:t>
+              <a:t>03/08/2023</a:t>
             </a:fld>
             <a:endParaRPr lang="en-GB"/>
           </a:p>
@@ -764,7 +764,7 @@
           <a:p>
             <a:fld id="{E53556A6-779D-436A-9960-E76995E88BDD}" type="datetimeFigureOut">
               <a:rPr lang="en-GB" smtClean="0"/>
-              <a:t>30/09/2022</a:t>
+              <a:t>03/08/2023</a:t>
             </a:fld>
             <a:endParaRPr lang="en-GB"/>
           </a:p>
@@ -1008,7 +1008,7 @@
           <a:p>
             <a:fld id="{E53556A6-779D-436A-9960-E76995E88BDD}" type="datetimeFigureOut">
               <a:rPr lang="en-GB" smtClean="0"/>
-              <a:t>30/09/2022</a:t>
+              <a:t>03/08/2023</a:t>
             </a:fld>
             <a:endParaRPr lang="en-GB"/>
           </a:p>
@@ -1240,7 +1240,7 @@
           <a:p>
             <a:fld id="{E53556A6-779D-436A-9960-E76995E88BDD}" type="datetimeFigureOut">
               <a:rPr lang="en-GB" smtClean="0"/>
-              <a:t>30/09/2022</a:t>
+              <a:t>03/08/2023</a:t>
             </a:fld>
             <a:endParaRPr lang="en-GB"/>
           </a:p>
@@ -1607,7 +1607,7 @@
           <a:p>
             <a:fld id="{E53556A6-779D-436A-9960-E76995E88BDD}" type="datetimeFigureOut">
               <a:rPr lang="en-GB" smtClean="0"/>
-              <a:t>30/09/2022</a:t>
+              <a:t>03/08/2023</a:t>
             </a:fld>
             <a:endParaRPr lang="en-GB"/>
           </a:p>
@@ -1725,7 +1725,7 @@
           <a:p>
             <a:fld id="{E53556A6-779D-436A-9960-E76995E88BDD}" type="datetimeFigureOut">
               <a:rPr lang="en-GB" smtClean="0"/>
-              <a:t>30/09/2022</a:t>
+              <a:t>03/08/2023</a:t>
             </a:fld>
             <a:endParaRPr lang="en-GB"/>
           </a:p>
@@ -1820,7 +1820,7 @@
           <a:p>
             <a:fld id="{E53556A6-779D-436A-9960-E76995E88BDD}" type="datetimeFigureOut">
               <a:rPr lang="en-GB" smtClean="0"/>
-              <a:t>30/09/2022</a:t>
+              <a:t>03/08/2023</a:t>
             </a:fld>
             <a:endParaRPr lang="en-GB"/>
           </a:p>
@@ -2097,7 +2097,7 @@
           <a:p>
             <a:fld id="{E53556A6-779D-436A-9960-E76995E88BDD}" type="datetimeFigureOut">
               <a:rPr lang="en-GB" smtClean="0"/>
-              <a:t>30/09/2022</a:t>
+              <a:t>03/08/2023</a:t>
             </a:fld>
             <a:endParaRPr lang="en-GB"/>
           </a:p>
@@ -2354,7 +2354,7 @@
           <a:p>
             <a:fld id="{E53556A6-779D-436A-9960-E76995E88BDD}" type="datetimeFigureOut">
               <a:rPr lang="en-GB" smtClean="0"/>
-              <a:t>30/09/2022</a:t>
+              <a:t>03/08/2023</a:t>
             </a:fld>
             <a:endParaRPr lang="en-GB"/>
           </a:p>
@@ -2567,7 +2567,7 @@
           <a:p>
             <a:fld id="{E53556A6-779D-436A-9960-E76995E88BDD}" type="datetimeFigureOut">
               <a:rPr lang="en-GB" smtClean="0"/>
-              <a:t>30/09/2022</a:t>
+              <a:t>03/08/2023</a:t>
             </a:fld>
             <a:endParaRPr lang="en-GB"/>
           </a:p>
@@ -3063,7 +3063,7 @@
                 <a:effectLst/>
                 <a:latin typeface="Times New Roman" panose="02020603050405020304" pitchFamily="18" charset="0"/>
                 <a:ea typeface="Times New Roman" panose="02020603050405020304" pitchFamily="18" charset="0"/>
-                <a:hlinkClick r:id="rId3">
+                <a:hlinkClick r:id="rId2">
                   <a:extLst>
                     <a:ext uri="{A12FA001-AC4F-418D-AE19-62706E023703}">
                       <ahyp:hlinkClr xmlns:ahyp="http://schemas.microsoft.com/office/drawing/2018/hyperlinkcolor" val="tx"/>
@@ -3078,7 +3078,7 @@
                 <a:effectLst/>
                 <a:latin typeface="Times New Roman" panose="02020603050405020304" pitchFamily="18" charset="0"/>
                 <a:ea typeface="Times New Roman" panose="02020603050405020304" pitchFamily="18" charset="0"/>
-                <a:hlinkClick r:id="rId3">
+                <a:hlinkClick r:id="rId2">
                   <a:extLst>
                     <a:ext uri="{A12FA001-AC4F-418D-AE19-62706E023703}">
                       <ahyp:hlinkClr xmlns:ahyp="http://schemas.microsoft.com/office/drawing/2018/hyperlinkcolor" val="tx"/>
@@ -3113,10 +3113,10 @@
         </p:nvGrpSpPr>
         <p:grpSpPr>
           <a:xfrm>
-            <a:off x="131938" y="57908"/>
-            <a:ext cx="7323724" cy="11639217"/>
-            <a:chOff x="131938" y="57908"/>
-            <a:chExt cx="7323724" cy="11639217"/>
+            <a:off x="162533" y="57908"/>
+            <a:ext cx="7293129" cy="11639217"/>
+            <a:chOff x="162533" y="57908"/>
+            <a:chExt cx="7293129" cy="11639217"/>
           </a:xfrm>
         </p:grpSpPr>
         <p:pic>
@@ -3134,7 +3134,7 @@
             <p:nvPr/>
           </p:nvPicPr>
           <p:blipFill>
-            <a:blip r:embed="rId4"/>
+            <a:blip r:embed="rId3"/>
             <a:stretch>
               <a:fillRect/>
             </a:stretch>
@@ -3819,7 +3819,7 @@
           </p:nvSpPr>
           <p:spPr>
             <a:xfrm>
-              <a:off x="135713" y="2749822"/>
+              <a:off x="211852" y="2763303"/>
               <a:ext cx="2980944" cy="646331"/>
             </a:xfrm>
             <a:prstGeom prst="rect">
@@ -4016,7 +4016,7 @@
               <a:pPr algn="just"/>
               <a:r>
                 <a:rPr lang="en-GB" sz="1200" dirty="0"/>
-                <a:t>Albert Einstein presents his quantum theory. Einstein explains the photoelectric effect by assuming that light consists of quantized energy packages that we call  photons.  </a:t>
+                <a:t>Albert Einstein presented his quantum theory. Einstein explained the photoelectric effect by assuming that light consists of quantized energy packages that we call  photons.  </a:t>
               </a:r>
             </a:p>
           </p:txBody>
@@ -4247,8 +4247,8 @@
           </p:nvSpPr>
           <p:spPr>
             <a:xfrm>
-              <a:off x="131938" y="4457844"/>
-              <a:ext cx="2925866" cy="830997"/>
+              <a:off x="245413" y="4423394"/>
+              <a:ext cx="2874541" cy="830997"/>
             </a:xfrm>
             <a:prstGeom prst="rect">
               <a:avLst/>
@@ -4339,7 +4339,7 @@
             <p:nvPr/>
           </p:nvPicPr>
           <p:blipFill>
-            <a:blip r:embed="rId5">
+            <a:blip r:embed="rId4">
               <a:extLst>
                 <a:ext uri="{28A0092B-C50C-407E-A947-70E740481C1C}">
                   <a14:useLocalDpi xmlns:a14="http://schemas.microsoft.com/office/drawing/2010/main" val="0"/>
@@ -4379,8 +4379,8 @@
           </p:nvSpPr>
           <p:spPr>
             <a:xfrm>
-              <a:off x="142777" y="6810872"/>
-              <a:ext cx="3034617" cy="830997"/>
+              <a:off x="162533" y="6813834"/>
+              <a:ext cx="2980944" cy="830997"/>
             </a:xfrm>
             <a:prstGeom prst="rect">
               <a:avLst/>
@@ -4396,7 +4396,7 @@
               <a:pPr algn="just"/>
               <a:r>
                 <a:rPr lang="en-GB" sz="1200" dirty="0"/>
-                <a:t>William B. Shockley, the coinventor of the transistor, explains the principles of operation of the </a:t>
+                <a:t>William B. Shockley, the coinventor of the transistor, explained the principles of operation of the </a:t>
               </a:r>
               <a:r>
                 <a:rPr lang="en-GB" sz="1200" dirty="0" err="1"/>
@@ -4404,7 +4404,7 @@
               </a:r>
               <a:r>
                 <a:rPr lang="en-GB" sz="1200" dirty="0"/>
-                <a:t> junction. PV solar cells are developed during this decade at Bell Labs.</a:t>
+                <a:t> junction. Solar cells were developed during this decade at Bell Labs.</a:t>
               </a:r>
             </a:p>
           </p:txBody>
@@ -4611,7 +4611,26 @@
                   <a:effectLst/>
                   <a:ea typeface="Times New Roman" panose="02020603050405020304" pitchFamily="18" charset="0"/>
                 </a:rPr>
-                <a:t>Daryl Chapin, Calvin Fuller, and Gerald Pearson in the Bell Labs presented the first silicon solar cell with an efficiency of 6% and an area of 2 cm</a:t>
+                <a:t>Daryl Chapin, Calvin Fuller, and Gerald Pearson </a:t>
+              </a:r>
+              <a:r>
+                <a:rPr lang="en-GB" sz="1200" dirty="0">
+                  <a:solidFill>
+                    <a:srgbClr val="0E101A"/>
+                  </a:solidFill>
+                  <a:ea typeface="Times New Roman" panose="02020603050405020304" pitchFamily="18" charset="0"/>
+                </a:rPr>
+                <a:t>at</a:t>
+              </a:r>
+              <a:r>
+                <a:rPr lang="en-GB" sz="1200" dirty="0">
+                  <a:solidFill>
+                    <a:srgbClr val="0E101A"/>
+                  </a:solidFill>
+                  <a:effectLst/>
+                  <a:ea typeface="Times New Roman" panose="02020603050405020304" pitchFamily="18" charset="0"/>
+                </a:rPr>
+                <a:t> Bell Labs presented the first silicon solar cell with an efficiency of 6% and an area of 2 cm</a:t>
               </a:r>
               <a:r>
                 <a:rPr lang="en-GB" sz="1200" baseline="30000" dirty="0">
@@ -4684,7 +4703,7 @@
                   <a:effectLst/>
                   <a:ea typeface="Times New Roman" panose="02020603050405020304" pitchFamily="18" charset="0"/>
                 </a:rPr>
-                <a:t> attaining also 6% efficiency was developed at Air Force based (USA)</a:t>
+                <a:t> attaining also 6% efficiency was developed at Air Force Base (USA)</a:t>
               </a:r>
             </a:p>
           </p:txBody>
@@ -5070,7 +5089,7 @@
             <p:nvPr/>
           </p:nvPicPr>
           <p:blipFill>
-            <a:blip r:embed="rId6">
+            <a:blip r:embed="rId5">
               <a:extLst>
                 <a:ext uri="{28A0092B-C50C-407E-A947-70E740481C1C}">
                   <a14:useLocalDpi xmlns:a14="http://schemas.microsoft.com/office/drawing/2010/main" val="0"/>
@@ -5339,7 +5358,7 @@
               <a:pPr algn="just"/>
               <a:r>
                 <a:rPr lang="en-GB" sz="1200" dirty="0"/>
-                <a:t>Bell Labs launches the first solar-powered telecommunications satellite (Telstar).</a:t>
+                <a:t>Bell Labs launched the first solar-powered telecommunications satellite (Telstar).</a:t>
               </a:r>
             </a:p>
             <a:p>
@@ -5593,12 +5612,12 @@
           <a:graphicData uri="http://schemas.openxmlformats.org/presentationml/2006/ole">
             <mc:AlternateContent xmlns:mc="http://schemas.openxmlformats.org/markup-compatibility/2006">
               <mc:Choice xmlns:v="urn:schemas-microsoft-com:vml" Requires="v">
-                <p:oleObj spid="_x0000_s1051" name="Bitmap Image" r:id="rId7" imgW="5295960" imgH="5181480" progId="Paint.Picture">
+                <p:oleObj name="Bitmap Image" r:id="rId6" imgW="5295960" imgH="5181480" progId="Paint.Picture">
                   <p:embed/>
                 </p:oleObj>
               </mc:Choice>
               <mc:Fallback>
-                <p:oleObj name="Bitmap Image" r:id="rId7" imgW="5295960" imgH="5181480" progId="Paint.Picture">
+                <p:oleObj name="Bitmap Image" r:id="rId6" imgW="5295960" imgH="5181480" progId="Paint.Picture">
                   <p:embed/>
                   <p:pic>
                     <p:nvPicPr>
@@ -5607,7 +5626,7 @@
                       <p:nvPr/>
                     </p:nvPicPr>
                     <p:blipFill>
-                      <a:blip r:embed="rId8"/>
+                      <a:blip r:embed="rId7"/>
                       <a:stretch>
                         <a:fillRect/>
                       </a:stretch>
@@ -5915,8 +5934,8 @@
           </p:nvSpPr>
           <p:spPr>
             <a:xfrm>
-              <a:off x="149127" y="1029738"/>
-              <a:ext cx="3034617" cy="1200329"/>
+              <a:off x="375169" y="1095486"/>
+              <a:ext cx="2855030" cy="1200329"/>
             </a:xfrm>
             <a:prstGeom prst="rect">
               <a:avLst/>
@@ -5958,7 +5977,27 @@
                   <a:effectLst/>
                   <a:ea typeface="Times New Roman" panose="02020603050405020304" pitchFamily="18" charset="0"/>
                 </a:rPr>
-                <a:t> Institute in San Petersburg led by Alferov developed a solar cell based on </a:t>
+                <a:t> Institute in San Petersburg led by </a:t>
+              </a:r>
+              <a:r>
+                <a:rPr lang="en-GB" sz="1200" dirty="0" err="1">
+                  <a:solidFill>
+                    <a:srgbClr val="0E101A"/>
+                  </a:solidFill>
+                  <a:effectLst/>
+                  <a:ea typeface="Times New Roman" panose="02020603050405020304" pitchFamily="18" charset="0"/>
+                </a:rPr>
+                <a:t>Zhores</a:t>
+              </a:r>
+              <a:r>
+                <a:rPr lang="en-GB" sz="1200" dirty="0">
+                  <a:solidFill>
+                    <a:srgbClr val="0E101A"/>
+                  </a:solidFill>
+                  <a:effectLst/>
+                  <a:ea typeface="Times New Roman" panose="02020603050405020304" pitchFamily="18" charset="0"/>
+                </a:rPr>
+                <a:t> I. Alferov developed a solar cell based on </a:t>
               </a:r>
               <a:r>
                 <a:rPr lang="en-GB" sz="1200" dirty="0" err="1">
@@ -5971,16 +6010,6 @@
                 <a:t>GaAlAs</a:t>
               </a:r>
               <a:r>
-                <a:rPr lang="en-GB" sz="1200">
-                  <a:solidFill>
-                    <a:srgbClr val="0E101A"/>
-                  </a:solidFill>
-                  <a:effectLst/>
-                  <a:ea typeface="Times New Roman" panose="02020603050405020304" pitchFamily="18" charset="0"/>
-                </a:rPr>
-                <a:t>/GaAs heterojunction</a:t>
-              </a:r>
-              <a:r>
                 <a:rPr lang="en-GB" sz="1200" dirty="0">
                   <a:solidFill>
                     <a:srgbClr val="0E101A"/>
@@ -5988,7 +6017,7 @@
                   <a:effectLst/>
                   <a:ea typeface="Times New Roman" panose="02020603050405020304" pitchFamily="18" charset="0"/>
                 </a:rPr>
-                <a:t>. The main benefits of GaAs cells were their high efficiency and resistance to the ionizing radiation in space.</a:t>
+                <a:t>/GaAs heterojunction. The main benefits of GaAs cells were their high efficiency and resistance to the ionizing radiation in space.</a:t>
               </a:r>
             </a:p>
           </p:txBody>
@@ -6396,7 +6425,7 @@
                   <a:effectLst/>
                   <a:ea typeface="Times New Roman" panose="02020603050405020304" pitchFamily="18" charset="0"/>
                 </a:rPr>
-                <a:t>The first solar-powered pocket calculators and watches arrive on the market.</a:t>
+                <a:t>The first solar-powered pocket calculators and watches arrived on the market.</a:t>
               </a:r>
               <a:endParaRPr lang="en-GB" sz="1200" dirty="0">
                 <a:effectLst/>
@@ -6554,7 +6583,7 @@
               <a:pPr algn="just"/>
               <a:r>
                 <a:rPr lang="en-GB" sz="1200" dirty="0"/>
-                <a:t>Solar PV covers 20% of the annual electricity demand in California (USA).</a:t>
+                <a:t>Solar PV covered 20% of the annual electricity demand in California (USA).</a:t>
               </a:r>
             </a:p>
           </p:txBody>
@@ -7121,7 +7150,7 @@
               <a:pPr algn="just"/>
               <a:r>
                 <a:rPr lang="en-GB" sz="1200" dirty="0"/>
-                <a:t>Cumulative global PV capacity reaches 1 TW</a:t>
+                <a:t>Cumulative global PV capacity reached 1 TW.</a:t>
               </a:r>
             </a:p>
           </p:txBody>
@@ -7559,7 +7588,7 @@
               <a:pPr algn="just"/>
               <a:r>
                 <a:rPr lang="en-GB" sz="1200" dirty="0"/>
-                <a:t>Cumulative Global PV capacity reaches 1 GW</a:t>
+                <a:t>Cumulative Global PV capacity reached 1 GW.</a:t>
               </a:r>
             </a:p>
           </p:txBody>
@@ -8065,7 +8094,7 @@
               <a:pPr algn="just"/>
               <a:r>
                 <a:rPr lang="en-GB" sz="1200" dirty="0"/>
-                <a:t>First 350 kW Concentrator-PV array installed in Saudi Arabia</a:t>
+                <a:t>First 350 kW Concentrator-PV array installed in Saudi Arabia.</a:t>
               </a:r>
             </a:p>
           </p:txBody>
@@ -8266,7 +8295,7 @@
               <a:pPr algn="just"/>
               <a:r>
                 <a:rPr lang="en-GB" sz="1200" dirty="0"/>
-                <a:t>First 1 MW utility-scale PV power plant with Arco Si modules on 2-axis trackers installed in California</a:t>
+                <a:t>First 1 MW utility-scale PV power plant with Arco Si modules on 2-axis trackers installed in California.</a:t>
               </a:r>
             </a:p>
           </p:txBody>
@@ -8475,15 +8504,7 @@
               </a:r>
               <a:r>
                 <a:rPr lang="en-GB" sz="1200" dirty="0"/>
-                <a:t> manufactures </a:t>
-              </a:r>
-              <a:r>
-                <a:rPr lang="en-GB" sz="1200"/>
-                <a:t>and installs </a:t>
-              </a:r>
-              <a:r>
-                <a:rPr lang="en-GB" sz="1200" dirty="0"/>
-                <a:t>bifacial PV panels</a:t>
+                <a:t> manufactured and installed bifacial PV panels.</a:t>
               </a:r>
             </a:p>
           </p:txBody>
@@ -8688,7 +8709,7 @@
               </a:r>
               <a:r>
                 <a:rPr lang="en-GB" sz="1200" dirty="0"/>
-                <a:t>/GaAs 2-terminal multijunction solar cell attained efficiency &gt;30% (NREL, USA)</a:t>
+                <a:t>/GaAs 2-terminal multijunction solar cell attained efficiency &gt;30% (NREL, USA).</a:t>
               </a:r>
             </a:p>
           </p:txBody>
@@ -9284,8 +9305,8 @@
           </p:nvSpPr>
           <p:spPr>
             <a:xfrm>
-              <a:off x="466650" y="9053491"/>
-              <a:ext cx="2698146" cy="461665"/>
+              <a:off x="375169" y="9053491"/>
+              <a:ext cx="2789627" cy="461665"/>
             </a:xfrm>
             <a:prstGeom prst="rect">
               <a:avLst/>
@@ -9301,7 +9322,7 @@
               <a:pPr algn="just"/>
               <a:r>
                 <a:rPr lang="en-GB" sz="1200" dirty="0"/>
-                <a:t>First silicon solar cell with 25% efficiency (PERL design) (UNSW, Australia) </a:t>
+                <a:t>First silicon solar cell with &gt;25% efficiency (PERL design) (UNSW, Australia) .</a:t>
               </a:r>
             </a:p>
           </p:txBody>
@@ -9320,8 +9341,8 @@
           </p:nvSpPr>
           <p:spPr>
             <a:xfrm>
-              <a:off x="240306" y="10022594"/>
-              <a:ext cx="3034617" cy="646331"/>
+              <a:off x="467877" y="10087619"/>
+              <a:ext cx="2712257" cy="830997"/>
             </a:xfrm>
             <a:prstGeom prst="rect">
               <a:avLst/>
@@ -9337,7 +9358,7 @@
               <a:pPr algn="just"/>
               <a:r>
                 <a:rPr lang="en-GB" sz="1200" dirty="0"/>
-                <a:t>The race for high-efficient commercial silicon cells results in innovative cell architectures (IBC, </a:t>
+                <a:t>The race for high-efficiency commercial silicon cells resulted in innovative cell architectures (IBC, </a:t>
               </a:r>
               <a:r>
                 <a:rPr lang="en-GB" sz="1200" dirty="0" err="1"/>
@@ -9345,7 +9366,7 @@
               </a:r>
               <a:r>
                 <a:rPr lang="en-GB" sz="1200" dirty="0"/>
-                <a:t>) with efficiency &gt;25%</a:t>
+                <a:t>) with efficiency &gt;25%.</a:t>
               </a:r>
             </a:p>
           </p:txBody>

</xml_diff>

<commit_message>
clean figures folder and add license
</commit_message>
<xml_diff>
--- a/Figures/Chapter_01/drawings/Fig_PV_history.pptx
+++ b/Figures/Chapter_01/drawings/Fig_PV_history.pptx
@@ -244,7 +244,7 @@
           <a:p>
             <a:fld id="{E53556A6-779D-436A-9960-E76995E88BDD}" type="datetimeFigureOut">
               <a:rPr lang="en-GB" smtClean="0"/>
-              <a:t>31/08/2023</a:t>
+              <a:t>06/11/2023</a:t>
             </a:fld>
             <a:endParaRPr lang="en-GB"/>
           </a:p>
@@ -414,7 +414,7 @@
           <a:p>
             <a:fld id="{E53556A6-779D-436A-9960-E76995E88BDD}" type="datetimeFigureOut">
               <a:rPr lang="en-GB" smtClean="0"/>
-              <a:t>31/08/2023</a:t>
+              <a:t>06/11/2023</a:t>
             </a:fld>
             <a:endParaRPr lang="en-GB"/>
           </a:p>
@@ -594,7 +594,7 @@
           <a:p>
             <a:fld id="{E53556A6-779D-436A-9960-E76995E88BDD}" type="datetimeFigureOut">
               <a:rPr lang="en-GB" smtClean="0"/>
-              <a:t>31/08/2023</a:t>
+              <a:t>06/11/2023</a:t>
             </a:fld>
             <a:endParaRPr lang="en-GB"/>
           </a:p>
@@ -764,7 +764,7 @@
           <a:p>
             <a:fld id="{E53556A6-779D-436A-9960-E76995E88BDD}" type="datetimeFigureOut">
               <a:rPr lang="en-GB" smtClean="0"/>
-              <a:t>31/08/2023</a:t>
+              <a:t>06/11/2023</a:t>
             </a:fld>
             <a:endParaRPr lang="en-GB"/>
           </a:p>
@@ -1008,7 +1008,7 @@
           <a:p>
             <a:fld id="{E53556A6-779D-436A-9960-E76995E88BDD}" type="datetimeFigureOut">
               <a:rPr lang="en-GB" smtClean="0"/>
-              <a:t>31/08/2023</a:t>
+              <a:t>06/11/2023</a:t>
             </a:fld>
             <a:endParaRPr lang="en-GB"/>
           </a:p>
@@ -1240,7 +1240,7 @@
           <a:p>
             <a:fld id="{E53556A6-779D-436A-9960-E76995E88BDD}" type="datetimeFigureOut">
               <a:rPr lang="en-GB" smtClean="0"/>
-              <a:t>31/08/2023</a:t>
+              <a:t>06/11/2023</a:t>
             </a:fld>
             <a:endParaRPr lang="en-GB"/>
           </a:p>
@@ -1607,7 +1607,7 @@
           <a:p>
             <a:fld id="{E53556A6-779D-436A-9960-E76995E88BDD}" type="datetimeFigureOut">
               <a:rPr lang="en-GB" smtClean="0"/>
-              <a:t>31/08/2023</a:t>
+              <a:t>06/11/2023</a:t>
             </a:fld>
             <a:endParaRPr lang="en-GB"/>
           </a:p>
@@ -1725,7 +1725,7 @@
           <a:p>
             <a:fld id="{E53556A6-779D-436A-9960-E76995E88BDD}" type="datetimeFigureOut">
               <a:rPr lang="en-GB" smtClean="0"/>
-              <a:t>31/08/2023</a:t>
+              <a:t>06/11/2023</a:t>
             </a:fld>
             <a:endParaRPr lang="en-GB"/>
           </a:p>
@@ -1820,7 +1820,7 @@
           <a:p>
             <a:fld id="{E53556A6-779D-436A-9960-E76995E88BDD}" type="datetimeFigureOut">
               <a:rPr lang="en-GB" smtClean="0"/>
-              <a:t>31/08/2023</a:t>
+              <a:t>06/11/2023</a:t>
             </a:fld>
             <a:endParaRPr lang="en-GB"/>
           </a:p>
@@ -2097,7 +2097,7 @@
           <a:p>
             <a:fld id="{E53556A6-779D-436A-9960-E76995E88BDD}" type="datetimeFigureOut">
               <a:rPr lang="en-GB" smtClean="0"/>
-              <a:t>31/08/2023</a:t>
+              <a:t>06/11/2023</a:t>
             </a:fld>
             <a:endParaRPr lang="en-GB"/>
           </a:p>
@@ -2354,7 +2354,7 @@
           <a:p>
             <a:fld id="{E53556A6-779D-436A-9960-E76995E88BDD}" type="datetimeFigureOut">
               <a:rPr lang="en-GB" smtClean="0"/>
-              <a:t>31/08/2023</a:t>
+              <a:t>06/11/2023</a:t>
             </a:fld>
             <a:endParaRPr lang="en-GB"/>
           </a:p>
@@ -2567,7 +2567,7 @@
           <a:p>
             <a:fld id="{E53556A6-779D-436A-9960-E76995E88BDD}" type="datetimeFigureOut">
               <a:rPr lang="en-GB" smtClean="0"/>
-              <a:t>31/08/2023</a:t>
+              <a:t>06/11/2023</a:t>
             </a:fld>
             <a:endParaRPr lang="en-GB"/>
           </a:p>
@@ -2972,133 +2972,6 @@
           <a:chExt cx="0" cy="0"/>
         </a:xfrm>
       </p:grpSpPr>
-      <p:sp>
-        <p:nvSpPr>
-          <p:cNvPr id="182" name="TextBox 181">
-            <a:extLst>
-              <a:ext uri="{FF2B5EF4-FFF2-40B4-BE49-F238E27FC236}">
-                <a16:creationId xmlns:a16="http://schemas.microsoft.com/office/drawing/2014/main" id="{AC2629F4-7BF6-478A-81C3-AD30D8A9DC0D}"/>
-              </a:ext>
-            </a:extLst>
-          </p:cNvPr>
-          <p:cNvSpPr txBox="1"/>
-          <p:nvPr/>
-        </p:nvSpPr>
-        <p:spPr>
-          <a:xfrm>
-            <a:off x="-7680726" y="57908"/>
-            <a:ext cx="6678739" cy="1754326"/>
-          </a:xfrm>
-          <a:prstGeom prst="rect">
-            <a:avLst/>
-          </a:prstGeom>
-          <a:noFill/>
-        </p:spPr>
-        <p:txBody>
-          <a:bodyPr wrap="square" rtlCol="0">
-            <a:spAutoFit/>
-          </a:bodyPr>
-          <a:lstStyle/>
-          <a:p>
-            <a:pPr algn="just"/>
-            <a:r>
-              <a:rPr lang="en-GB" sz="1800" b="1" dirty="0">
-                <a:effectLst/>
-                <a:latin typeface="Calibri" panose="020F0502020204030204" pitchFamily="34" charset="0"/>
-                <a:ea typeface="Times New Roman" panose="02020603050405020304" pitchFamily="18" charset="0"/>
-              </a:rPr>
-              <a:t>1958</a:t>
-            </a:r>
-            <a:r>
-              <a:rPr lang="en-GB" sz="1800" dirty="0">
-                <a:effectLst/>
-                <a:latin typeface="Calibri" panose="020F0502020204030204" pitchFamily="34" charset="0"/>
-                <a:ea typeface="Times New Roman" panose="02020603050405020304" pitchFamily="18" charset="0"/>
-              </a:rPr>
-              <a:t>: The American satellite Vanguard 1 is launched. It was the first satellite with a solar PV power </a:t>
-            </a:r>
-            <a:r>
-              <a:rPr lang="en-GB" sz="1800">
-                <a:effectLst/>
-                <a:latin typeface="Calibri" panose="020F0502020204030204" pitchFamily="34" charset="0"/>
-                <a:ea typeface="Times New Roman" panose="02020603050405020304" pitchFamily="18" charset="0"/>
-              </a:rPr>
-              <a:t>system.</a:t>
-            </a:r>
-          </a:p>
-          <a:p>
-            <a:pPr algn="just"/>
-            <a:endParaRPr lang="en-GB" sz="1800" dirty="0">
-              <a:effectLst/>
-              <a:latin typeface="Times New Roman" panose="02020603050405020304" pitchFamily="18" charset="0"/>
-              <a:ea typeface="Times New Roman" panose="02020603050405020304" pitchFamily="18" charset="0"/>
-            </a:endParaRPr>
-          </a:p>
-          <a:p>
-            <a:pPr algn="just"/>
-            <a:r>
-              <a:rPr lang="en-GB" sz="1800" dirty="0">
-                <a:effectLst/>
-                <a:latin typeface="Times-Roman"/>
-                <a:ea typeface="Times New Roman" panose="02020603050405020304" pitchFamily="18" charset="0"/>
-                <a:cs typeface="Times-Roman"/>
-              </a:rPr>
-              <a:t>Sputnik II satellite in 1957, was already powered with silicon cells.</a:t>
-            </a:r>
-          </a:p>
-          <a:p>
-            <a:pPr algn="just"/>
-            <a:endParaRPr lang="en-GB" dirty="0">
-              <a:latin typeface="Times-Roman"/>
-              <a:ea typeface="Times New Roman" panose="02020603050405020304" pitchFamily="18" charset="0"/>
-            </a:endParaRPr>
-          </a:p>
-          <a:p>
-            <a:pPr algn="just"/>
-            <a:r>
-              <a:rPr lang="en-GB" sz="1800" dirty="0">
-                <a:solidFill>
-                  <a:srgbClr val="0563C1"/>
-                </a:solidFill>
-                <a:effectLst/>
-                <a:latin typeface="Times New Roman" panose="02020603050405020304" pitchFamily="18" charset="0"/>
-                <a:ea typeface="Times New Roman" panose="02020603050405020304" pitchFamily="18" charset="0"/>
-                <a:hlinkClick r:id="rId2">
-                  <a:extLst>
-                    <a:ext uri="{A12FA001-AC4F-418D-AE19-62706E023703}">
-                      <ahyp:hlinkClr xmlns:ahyp="http://schemas.microsoft.com/office/drawing/2018/hyperlinkcolor" val="tx"/>
-                    </a:ext>
-                  </a:extLst>
-                </a:hlinkClick>
-              </a:rPr>
-              <a:t>https://www.nrel.gov/docs/fy04osti/33947.</a:t>
-            </a:r>
-            <a:r>
-              <a:rPr lang="en-GB" sz="1800" dirty="0">
-                <a:effectLst/>
-                <a:latin typeface="Times New Roman" panose="02020603050405020304" pitchFamily="18" charset="0"/>
-                <a:ea typeface="Times New Roman" panose="02020603050405020304" pitchFamily="18" charset="0"/>
-                <a:hlinkClick r:id="rId2">
-                  <a:extLst>
-                    <a:ext uri="{A12FA001-AC4F-418D-AE19-62706E023703}">
-                      <ahyp:hlinkClr xmlns:ahyp="http://schemas.microsoft.com/office/drawing/2018/hyperlinkcolor" val="tx"/>
-                    </a:ext>
-                  </a:extLst>
-                </a:hlinkClick>
-              </a:rPr>
-              <a:t>pdf</a:t>
-            </a:r>
-            <a:r>
-              <a:rPr lang="en-GB" sz="1800" dirty="0">
-                <a:effectLst/>
-                <a:latin typeface="Times New Roman" panose="02020603050405020304" pitchFamily="18" charset="0"/>
-                <a:ea typeface="Times New Roman" panose="02020603050405020304" pitchFamily="18" charset="0"/>
-              </a:rPr>
-              <a:t> </a:t>
-            </a:r>
-          </a:p>
-        </p:txBody>
-      </p:sp>
       <p:grpSp>
         <p:nvGrpSpPr>
           <p:cNvPr id="254" name="Group 253">
@@ -3134,7 +3007,7 @@
             <p:nvPr/>
           </p:nvPicPr>
           <p:blipFill>
-            <a:blip r:embed="rId3"/>
+            <a:blip r:embed="rId2"/>
             <a:stretch>
               <a:fillRect/>
             </a:stretch>
@@ -4339,7 +4212,7 @@
             <p:nvPr/>
           </p:nvPicPr>
           <p:blipFill>
-            <a:blip r:embed="rId4">
+            <a:blip r:embed="rId3">
               <a:extLst>
                 <a:ext uri="{28A0092B-C50C-407E-A947-70E740481C1C}">
                   <a14:useLocalDpi xmlns:a14="http://schemas.microsoft.com/office/drawing/2010/main" val="0"/>
@@ -5089,7 +4962,7 @@
             <p:nvPr/>
           </p:nvPicPr>
           <p:blipFill>
-            <a:blip r:embed="rId5">
+            <a:blip r:embed="rId4">
               <a:extLst>
                 <a:ext uri="{28A0092B-C50C-407E-A947-70E740481C1C}">
                   <a14:useLocalDpi xmlns:a14="http://schemas.microsoft.com/office/drawing/2010/main" val="0"/>
@@ -5584,69 +5457,6 @@
           </p:txBody>
         </p:sp>
       </p:grpSp>
-      <p:graphicFrame>
-        <p:nvGraphicFramePr>
-          <p:cNvPr id="253" name="Object 252">
-            <a:extLst>
-              <a:ext uri="{FF2B5EF4-FFF2-40B4-BE49-F238E27FC236}">
-                <a16:creationId xmlns:a16="http://schemas.microsoft.com/office/drawing/2014/main" id="{7D3A6A8D-0CB0-44E5-864E-69C11CF11BCD}"/>
-              </a:ext>
-            </a:extLst>
-          </p:cNvPr>
-          <p:cNvGraphicFramePr>
-            <a:graphicFrameLocks noChangeAspect="1"/>
-          </p:cNvGraphicFramePr>
-          <p:nvPr>
-            <p:extLst>
-              <p:ext uri="{D42A27DB-BD31-4B8C-83A1-F6EECF244321}">
-                <p14:modId xmlns:p14="http://schemas.microsoft.com/office/powerpoint/2010/main" val="1994033354"/>
-              </p:ext>
-            </p:extLst>
-          </p:nvPr>
-        </p:nvGraphicFramePr>
-        <p:xfrm>
-          <a:off x="-7010361" y="2303443"/>
-          <a:ext cx="2332325" cy="2281987"/>
-        </p:xfrm>
-        <a:graphic>
-          <a:graphicData uri="http://schemas.openxmlformats.org/presentationml/2006/ole">
-            <mc:AlternateContent xmlns:mc="http://schemas.openxmlformats.org/markup-compatibility/2006">
-              <mc:Choice xmlns:v="urn:schemas-microsoft-com:vml" Requires="v">
-                <p:oleObj name="Bitmap Image" r:id="rId6" imgW="5295960" imgH="5181480" progId="Paint.Picture">
-                  <p:embed/>
-                </p:oleObj>
-              </mc:Choice>
-              <mc:Fallback>
-                <p:oleObj name="Bitmap Image" r:id="rId6" imgW="5295960" imgH="5181480" progId="Paint.Picture">
-                  <p:embed/>
-                  <p:pic>
-                    <p:nvPicPr>
-                      <p:cNvPr id="0" name=""/>
-                      <p:cNvPicPr/>
-                      <p:nvPr/>
-                    </p:nvPicPr>
-                    <p:blipFill>
-                      <a:blip r:embed="rId7"/>
-                      <a:stretch>
-                        <a:fillRect/>
-                      </a:stretch>
-                    </p:blipFill>
-                    <p:spPr>
-                      <a:xfrm>
-                        <a:off x="-7010361" y="2303443"/>
-                        <a:ext cx="2332325" cy="2281987"/>
-                      </a:xfrm>
-                      <a:prstGeom prst="rect">
-                        <a:avLst/>
-                      </a:prstGeom>
-                    </p:spPr>
-                  </p:pic>
-                </p:oleObj>
-              </mc:Fallback>
-            </mc:AlternateContent>
-          </a:graphicData>
-        </a:graphic>
-      </p:graphicFrame>
     </p:spTree>
     <p:extLst>
       <p:ext uri="{BB962C8B-B14F-4D97-AF65-F5344CB8AC3E}">
@@ -5677,188 +5487,6 @@
           <a:chExt cx="0" cy="0"/>
         </a:xfrm>
       </p:grpSpPr>
-      <p:sp>
-        <p:nvSpPr>
-          <p:cNvPr id="85" name="TextBox 84">
-            <a:extLst>
-              <a:ext uri="{FF2B5EF4-FFF2-40B4-BE49-F238E27FC236}">
-                <a16:creationId xmlns:a16="http://schemas.microsoft.com/office/drawing/2014/main" id="{526ADE49-E543-4F8F-832B-FB46A0EC1EB7}"/>
-              </a:ext>
-            </a:extLst>
-          </p:cNvPr>
-          <p:cNvSpPr txBox="1"/>
-          <p:nvPr/>
-        </p:nvSpPr>
-        <p:spPr>
-          <a:xfrm>
-            <a:off x="-3756880" y="3142847"/>
-            <a:ext cx="2465323" cy="461665"/>
-          </a:xfrm>
-          <a:prstGeom prst="rect">
-            <a:avLst/>
-          </a:prstGeom>
-          <a:noFill/>
-        </p:spPr>
-        <p:txBody>
-          <a:bodyPr wrap="square" rtlCol="0">
-            <a:spAutoFit/>
-          </a:bodyPr>
-          <a:lstStyle/>
-          <a:p>
-            <a:pPr algn="just"/>
-            <a:r>
-              <a:rPr lang="en-GB" sz="1200" dirty="0" err="1">
-                <a:latin typeface="Calibri" panose="020F0502020204030204" pitchFamily="34" charset="0"/>
-                <a:ea typeface="Times New Roman" panose="02020603050405020304" pitchFamily="18" charset="0"/>
-              </a:rPr>
-              <a:t>Todelo</a:t>
-            </a:r>
-            <a:r>
-              <a:rPr lang="en-GB" sz="1200" dirty="0">
-                <a:latin typeface="Calibri" panose="020F0502020204030204" pitchFamily="34" charset="0"/>
-                <a:ea typeface="Times New Roman" panose="02020603050405020304" pitchFamily="18" charset="0"/>
-              </a:rPr>
-              <a:t> PV es de 1994, </a:t>
-            </a:r>
-            <a:r>
-              <a:rPr lang="en-GB" sz="1200" dirty="0" err="1">
-                <a:latin typeface="Calibri" panose="020F0502020204030204" pitchFamily="34" charset="0"/>
-                <a:ea typeface="Times New Roman" panose="02020603050405020304" pitchFamily="18" charset="0"/>
-              </a:rPr>
-              <a:t>casi</a:t>
-            </a:r>
-            <a:r>
-              <a:rPr lang="en-GB" sz="1200" dirty="0">
-                <a:latin typeface="Calibri" panose="020F0502020204030204" pitchFamily="34" charset="0"/>
-                <a:ea typeface="Times New Roman" panose="02020603050405020304" pitchFamily="18" charset="0"/>
-              </a:rPr>
-              <a:t> 12 </a:t>
-            </a:r>
-            <a:r>
-              <a:rPr lang="en-GB" sz="1200" dirty="0" err="1">
-                <a:latin typeface="Calibri" panose="020F0502020204030204" pitchFamily="34" charset="0"/>
-                <a:ea typeface="Times New Roman" panose="02020603050405020304" pitchFamily="18" charset="0"/>
-              </a:rPr>
-              <a:t>años</a:t>
-            </a:r>
-            <a:r>
-              <a:rPr lang="en-GB" sz="1200" dirty="0">
-                <a:latin typeface="Calibri" panose="020F0502020204030204" pitchFamily="34" charset="0"/>
-                <a:ea typeface="Times New Roman" panose="02020603050405020304" pitchFamily="18" charset="0"/>
-              </a:rPr>
-              <a:t> </a:t>
-            </a:r>
-            <a:r>
-              <a:rPr lang="en-GB" sz="1200" dirty="0" err="1">
-                <a:latin typeface="Calibri" panose="020F0502020204030204" pitchFamily="34" charset="0"/>
-                <a:ea typeface="Times New Roman" panose="02020603050405020304" pitchFamily="18" charset="0"/>
-              </a:rPr>
-              <a:t>después</a:t>
-            </a:r>
-            <a:r>
-              <a:rPr lang="en-GB" sz="1200" dirty="0">
-                <a:latin typeface="Calibri" panose="020F0502020204030204" pitchFamily="34" charset="0"/>
-                <a:ea typeface="Times New Roman" panose="02020603050405020304" pitchFamily="18" charset="0"/>
-              </a:rPr>
-              <a:t> de la de California</a:t>
-            </a:r>
-            <a:endParaRPr lang="en-GB" sz="1200" dirty="0">
-              <a:effectLst/>
-              <a:latin typeface="Times New Roman" panose="02020603050405020304" pitchFamily="18" charset="0"/>
-              <a:ea typeface="Times New Roman" panose="02020603050405020304" pitchFamily="18" charset="0"/>
-            </a:endParaRPr>
-          </a:p>
-        </p:txBody>
-      </p:sp>
-      <p:pic>
-        <p:nvPicPr>
-          <p:cNvPr id="5" name="Picture 4" descr="A picture containing fan, device, appliance&#10;&#10;Description automatically generated">
-            <a:extLst>
-              <a:ext uri="{FF2B5EF4-FFF2-40B4-BE49-F238E27FC236}">
-                <a16:creationId xmlns:a16="http://schemas.microsoft.com/office/drawing/2014/main" id="{318DFC7B-7329-47F5-AC19-C8BC309DDAE0}"/>
-              </a:ext>
-            </a:extLst>
-          </p:cNvPr>
-          <p:cNvPicPr>
-            <a:picLocks noChangeAspect="1"/>
-          </p:cNvPicPr>
-          <p:nvPr/>
-        </p:nvPicPr>
-        <p:blipFill>
-          <a:blip r:embed="rId2" cstate="hqprint">
-            <a:extLst>
-              <a:ext uri="{28A0092B-C50C-407E-A947-70E740481C1C}">
-                <a14:useLocalDpi xmlns:a14="http://schemas.microsoft.com/office/drawing/2010/main" val="0"/>
-              </a:ext>
-            </a:extLst>
-          </a:blip>
-          <a:stretch>
-            <a:fillRect/>
-          </a:stretch>
-        </p:blipFill>
-        <p:spPr>
-          <a:xfrm>
-            <a:off x="-7557074" y="1016464"/>
-            <a:ext cx="3563804" cy="4882578"/>
-          </a:xfrm>
-          <a:prstGeom prst="rect">
-            <a:avLst/>
-          </a:prstGeom>
-        </p:spPr>
-      </p:pic>
-      <p:pic>
-        <p:nvPicPr>
-          <p:cNvPr id="83" name="Picture 82" descr="diapositiva-42">
-            <a:extLst>
-              <a:ext uri="{FF2B5EF4-FFF2-40B4-BE49-F238E27FC236}">
-                <a16:creationId xmlns:a16="http://schemas.microsoft.com/office/drawing/2014/main" id="{B84D3F3D-0BD3-42CF-B5C1-639772FFAABA}"/>
-              </a:ext>
-            </a:extLst>
-          </p:cNvPr>
-          <p:cNvPicPr>
-            <a:picLocks noChangeAspect="1" noChangeArrowheads="1"/>
-          </p:cNvPicPr>
-          <p:nvPr/>
-        </p:nvPicPr>
-        <p:blipFill>
-          <a:blip r:embed="rId3" cstate="hqprint">
-            <a:extLst>
-              <a:ext uri="{28A0092B-C50C-407E-A947-70E740481C1C}">
-                <a14:useLocalDpi xmlns:a14="http://schemas.microsoft.com/office/drawing/2010/main" val="0"/>
-              </a:ext>
-            </a:extLst>
-          </a:blip>
-          <a:srcRect/>
-          <a:stretch>
-            <a:fillRect/>
-          </a:stretch>
-        </p:blipFill>
-        <p:spPr bwMode="auto">
-          <a:xfrm>
-            <a:off x="-3756880" y="1010402"/>
-            <a:ext cx="3036223" cy="1894288"/>
-          </a:xfrm>
-          <a:prstGeom prst="rect">
-            <a:avLst/>
-          </a:prstGeom>
-          <a:noFill/>
-          <a:ln w="9525">
-            <a:noFill/>
-            <a:miter lim="800000"/>
-            <a:headEnd/>
-            <a:tailEnd/>
-          </a:ln>
-          <a:extLst>
-            <a:ext uri="{909E8E84-426E-40DD-AFC4-6F175D3DCCD1}">
-              <a14:hiddenFill xmlns:a14="http://schemas.microsoft.com/office/drawing/2010/main">
-                <a:solidFill>
-                  <a:srgbClr val="FFFFFF"/>
-                </a:solidFill>
-              </a14:hiddenFill>
-            </a:ext>
-          </a:extLst>
-        </p:spPr>
-      </p:pic>
       <p:grpSp>
         <p:nvGrpSpPr>
           <p:cNvPr id="6" name="Group 5">
@@ -6980,7 +6608,7 @@
             <p:nvPr/>
           </p:nvPicPr>
           <p:blipFill>
-            <a:blip r:embed="rId4" cstate="hqprint">
+            <a:blip r:embed="rId2" cstate="hqprint">
               <a:extLst>
                 <a:ext uri="{28A0092B-C50C-407E-A947-70E740481C1C}">
                   <a14:useLocalDpi xmlns:a14="http://schemas.microsoft.com/office/drawing/2010/main" val="0"/>
@@ -7418,7 +7046,7 @@
             <p:nvPr/>
           </p:nvPicPr>
           <p:blipFill>
-            <a:blip r:embed="rId5">
+            <a:blip r:embed="rId3">
               <a:extLst>
                 <a:ext uri="{28A0092B-C50C-407E-A947-70E740481C1C}">
                   <a14:useLocalDpi xmlns:a14="http://schemas.microsoft.com/office/drawing/2010/main" val="0"/>
@@ -7842,7 +7470,7 @@
             <p:nvPr/>
           </p:nvPicPr>
           <p:blipFill>
-            <a:blip r:embed="rId6">
+            <a:blip r:embed="rId4">
               <a:extLst>
                 <a:ext uri="{28A0092B-C50C-407E-A947-70E740481C1C}">
                   <a14:useLocalDpi xmlns:a14="http://schemas.microsoft.com/office/drawing/2010/main" val="0"/>
@@ -7878,7 +7506,7 @@
             <p:nvPr/>
           </p:nvPicPr>
           <p:blipFill rotWithShape="1">
-            <a:blip r:embed="rId7" cstate="hqprint">
+            <a:blip r:embed="rId5" cstate="hqprint">
               <a:extLst>
                 <a:ext uri="{28A0092B-C50C-407E-A947-70E740481C1C}">
                   <a14:useLocalDpi xmlns:a14="http://schemas.microsoft.com/office/drawing/2010/main" val="0"/>
@@ -8930,7 +8558,7 @@
             <p:nvPr/>
           </p:nvPicPr>
           <p:blipFill>
-            <a:blip r:embed="rId8" cstate="hqprint">
+            <a:blip r:embed="rId6" cstate="hqprint">
               <a:extLst>
                 <a:ext uri="{28A0092B-C50C-407E-A947-70E740481C1C}">
                   <a14:useLocalDpi xmlns:a14="http://schemas.microsoft.com/office/drawing/2010/main" val="0"/>

</xml_diff>